<commit_message>
prepare end presentation + finish architecture diagrams
</commit_message>
<xml_diff>
--- a/End-Präsentation.pptx
+++ b/End-Präsentation.pptx
@@ -5,7 +5,7 @@
     <p:sldMasterId id="2147483648" r:id="rId1"/>
   </p:sldMasterIdLst>
   <p:notesMasterIdLst>
-    <p:notesMasterId r:id="rId13"/>
+    <p:notesMasterId r:id="rId15"/>
   </p:notesMasterIdLst>
   <p:sldIdLst>
     <p:sldId id="256" r:id="rId2"/>
@@ -15,10 +15,12 @@
     <p:sldId id="346" r:id="rId6"/>
     <p:sldId id="341" r:id="rId7"/>
     <p:sldId id="353" r:id="rId8"/>
-    <p:sldId id="343" r:id="rId9"/>
-    <p:sldId id="354" r:id="rId10"/>
-    <p:sldId id="345" r:id="rId11"/>
-    <p:sldId id="268" r:id="rId12"/>
+    <p:sldId id="354" r:id="rId9"/>
+    <p:sldId id="355" r:id="rId10"/>
+    <p:sldId id="356" r:id="rId11"/>
+    <p:sldId id="357" r:id="rId12"/>
+    <p:sldId id="345" r:id="rId13"/>
+    <p:sldId id="268" r:id="rId14"/>
   </p:sldIdLst>
   <p:sldSz cx="12192000" cy="6858000"/>
   <p:notesSz cx="6858000" cy="9144000"/>
@@ -12436,7 +12438,7 @@
           <a:p>
             <a:fld id="{290CDF47-B23A-4CC5-A56C-0A86BE245ADB}" type="datetimeFigureOut">
               <a:rPr lang="de-DE" smtClean="0"/>
-              <a:t>02.07.2024</a:t>
+              <a:t>04.07.2024</a:t>
             </a:fld>
             <a:endParaRPr lang="de-DE"/>
           </a:p>
@@ -13116,7 +13118,7 @@
           <a:p>
             <a:fld id="{7019B76D-A09E-4559-8E19-D159EA5CA74D}" type="slidenum">
               <a:rPr lang="de-DE" smtClean="0"/>
-              <a:t>9</a:t>
+              <a:t>8</a:t>
             </a:fld>
             <a:endParaRPr lang="de-DE"/>
           </a:p>
@@ -13203,7 +13205,268 @@
           <a:p>
             <a:fld id="{7019B76D-A09E-4559-8E19-D159EA5CA74D}" type="slidenum">
               <a:rPr lang="de-DE" smtClean="0"/>
+              <a:t>9</a:t>
+            </a:fld>
+            <a:endParaRPr lang="de-DE"/>
+          </a:p>
+        </p:txBody>
+      </p:sp>
+    </p:spTree>
+    <p:extLst>
+      <p:ext uri="{BB962C8B-B14F-4D97-AF65-F5344CB8AC3E}">
+        <p14:creationId xmlns:p14="http://schemas.microsoft.com/office/powerpoint/2010/main" val="2052487397"/>
+      </p:ext>
+    </p:extLst>
+  </p:cSld>
+  <p:clrMapOvr>
+    <a:masterClrMapping/>
+  </p:clrMapOvr>
+</p:notes>
+</file>
+
+<file path=ppt/notesSlides/notesSlide7.xml><?xml version="1.0" encoding="utf-8"?>
+<p:notes xmlns:a="http://schemas.openxmlformats.org/drawingml/2006/main" xmlns:r="http://schemas.openxmlformats.org/officeDocument/2006/relationships" xmlns:p="http://schemas.openxmlformats.org/presentationml/2006/main">
+  <p:cSld>
+    <p:spTree>
+      <p:nvGrpSpPr>
+        <p:cNvPr id="1" name=""/>
+        <p:cNvGrpSpPr/>
+        <p:nvPr/>
+      </p:nvGrpSpPr>
+      <p:grpSpPr>
+        <a:xfrm>
+          <a:off x="0" y="0"/>
+          <a:ext cx="0" cy="0"/>
+          <a:chOff x="0" y="0"/>
+          <a:chExt cx="0" cy="0"/>
+        </a:xfrm>
+      </p:grpSpPr>
+      <p:sp>
+        <p:nvSpPr>
+          <p:cNvPr id="2" name="Folienbildplatzhalter 1"/>
+          <p:cNvSpPr>
+            <a:spLocks noGrp="1" noRot="1" noChangeAspect="1"/>
+          </p:cNvSpPr>
+          <p:nvPr>
+            <p:ph type="sldImg"/>
+          </p:nvPr>
+        </p:nvSpPr>
+        <p:spPr/>
+      </p:sp>
+      <p:sp>
+        <p:nvSpPr>
+          <p:cNvPr id="3" name="Notizenplatzhalter 2"/>
+          <p:cNvSpPr>
+            <a:spLocks noGrp="1"/>
+          </p:cNvSpPr>
+          <p:nvPr>
+            <p:ph type="body" idx="1"/>
+          </p:nvPr>
+        </p:nvSpPr>
+        <p:spPr/>
+        <p:txBody>
+          <a:bodyPr/>
+          <a:lstStyle/>
+          <a:p>
+            <a:r>
+              <a:rPr lang="de-DE" dirty="0"/>
+              <a:t>Folie zu erklären was machen Walzen überhaupt? Was ist das?</a:t>
+            </a:r>
+          </a:p>
+        </p:txBody>
+      </p:sp>
+      <p:sp>
+        <p:nvSpPr>
+          <p:cNvPr id="4" name="Foliennummernplatzhalter 3"/>
+          <p:cNvSpPr>
+            <a:spLocks noGrp="1"/>
+          </p:cNvSpPr>
+          <p:nvPr>
+            <p:ph type="sldNum" sz="quarter" idx="5"/>
+          </p:nvPr>
+        </p:nvSpPr>
+        <p:spPr/>
+        <p:txBody>
+          <a:bodyPr/>
+          <a:lstStyle/>
+          <a:p>
+            <a:fld id="{7019B76D-A09E-4559-8E19-D159EA5CA74D}" type="slidenum">
+              <a:rPr lang="de-DE" smtClean="0"/>
+              <a:t>10</a:t>
+            </a:fld>
+            <a:endParaRPr lang="de-DE"/>
+          </a:p>
+        </p:txBody>
+      </p:sp>
+    </p:spTree>
+    <p:extLst>
+      <p:ext uri="{BB962C8B-B14F-4D97-AF65-F5344CB8AC3E}">
+        <p14:creationId xmlns:p14="http://schemas.microsoft.com/office/powerpoint/2010/main" val="3585321477"/>
+      </p:ext>
+    </p:extLst>
+  </p:cSld>
+  <p:clrMapOvr>
+    <a:masterClrMapping/>
+  </p:clrMapOvr>
+</p:notes>
+</file>
+
+<file path=ppt/notesSlides/notesSlide8.xml><?xml version="1.0" encoding="utf-8"?>
+<p:notes xmlns:a="http://schemas.openxmlformats.org/drawingml/2006/main" xmlns:r="http://schemas.openxmlformats.org/officeDocument/2006/relationships" xmlns:p="http://schemas.openxmlformats.org/presentationml/2006/main">
+  <p:cSld>
+    <p:spTree>
+      <p:nvGrpSpPr>
+        <p:cNvPr id="1" name=""/>
+        <p:cNvGrpSpPr/>
+        <p:nvPr/>
+      </p:nvGrpSpPr>
+      <p:grpSpPr>
+        <a:xfrm>
+          <a:off x="0" y="0"/>
+          <a:ext cx="0" cy="0"/>
+          <a:chOff x="0" y="0"/>
+          <a:chExt cx="0" cy="0"/>
+        </a:xfrm>
+      </p:grpSpPr>
+      <p:sp>
+        <p:nvSpPr>
+          <p:cNvPr id="2" name="Folienbildplatzhalter 1"/>
+          <p:cNvSpPr>
+            <a:spLocks noGrp="1" noRot="1" noChangeAspect="1"/>
+          </p:cNvSpPr>
+          <p:nvPr>
+            <p:ph type="sldImg"/>
+          </p:nvPr>
+        </p:nvSpPr>
+        <p:spPr/>
+      </p:sp>
+      <p:sp>
+        <p:nvSpPr>
+          <p:cNvPr id="3" name="Notizenplatzhalter 2"/>
+          <p:cNvSpPr>
+            <a:spLocks noGrp="1"/>
+          </p:cNvSpPr>
+          <p:nvPr>
+            <p:ph type="body" idx="1"/>
+          </p:nvPr>
+        </p:nvSpPr>
+        <p:spPr/>
+        <p:txBody>
+          <a:bodyPr/>
+          <a:lstStyle/>
+          <a:p>
+            <a:r>
+              <a:rPr lang="de-DE" dirty="0"/>
+              <a:t>Folie zu erklären was machen Walzen überhaupt? Was ist das?</a:t>
+            </a:r>
+          </a:p>
+        </p:txBody>
+      </p:sp>
+      <p:sp>
+        <p:nvSpPr>
+          <p:cNvPr id="4" name="Foliennummernplatzhalter 3"/>
+          <p:cNvSpPr>
+            <a:spLocks noGrp="1"/>
+          </p:cNvSpPr>
+          <p:nvPr>
+            <p:ph type="sldNum" sz="quarter" idx="5"/>
+          </p:nvPr>
+        </p:nvSpPr>
+        <p:spPr/>
+        <p:txBody>
+          <a:bodyPr/>
+          <a:lstStyle/>
+          <a:p>
+            <a:fld id="{7019B76D-A09E-4559-8E19-D159EA5CA74D}" type="slidenum">
+              <a:rPr lang="de-DE" smtClean="0"/>
               <a:t>11</a:t>
+            </a:fld>
+            <a:endParaRPr lang="de-DE"/>
+          </a:p>
+        </p:txBody>
+      </p:sp>
+    </p:spTree>
+    <p:extLst>
+      <p:ext uri="{BB962C8B-B14F-4D97-AF65-F5344CB8AC3E}">
+        <p14:creationId xmlns:p14="http://schemas.microsoft.com/office/powerpoint/2010/main" val="2426341607"/>
+      </p:ext>
+    </p:extLst>
+  </p:cSld>
+  <p:clrMapOvr>
+    <a:masterClrMapping/>
+  </p:clrMapOvr>
+</p:notes>
+</file>
+
+<file path=ppt/notesSlides/notesSlide9.xml><?xml version="1.0" encoding="utf-8"?>
+<p:notes xmlns:a="http://schemas.openxmlformats.org/drawingml/2006/main" xmlns:r="http://schemas.openxmlformats.org/officeDocument/2006/relationships" xmlns:p="http://schemas.openxmlformats.org/presentationml/2006/main">
+  <p:cSld>
+    <p:spTree>
+      <p:nvGrpSpPr>
+        <p:cNvPr id="1" name=""/>
+        <p:cNvGrpSpPr/>
+        <p:nvPr/>
+      </p:nvGrpSpPr>
+      <p:grpSpPr>
+        <a:xfrm>
+          <a:off x="0" y="0"/>
+          <a:ext cx="0" cy="0"/>
+          <a:chOff x="0" y="0"/>
+          <a:chExt cx="0" cy="0"/>
+        </a:xfrm>
+      </p:grpSpPr>
+      <p:sp>
+        <p:nvSpPr>
+          <p:cNvPr id="2" name="Folienbildplatzhalter 1"/>
+          <p:cNvSpPr>
+            <a:spLocks noGrp="1" noRot="1" noChangeAspect="1"/>
+          </p:cNvSpPr>
+          <p:nvPr>
+            <p:ph type="sldImg"/>
+          </p:nvPr>
+        </p:nvSpPr>
+        <p:spPr/>
+      </p:sp>
+      <p:sp>
+        <p:nvSpPr>
+          <p:cNvPr id="3" name="Notizenplatzhalter 2"/>
+          <p:cNvSpPr>
+            <a:spLocks noGrp="1"/>
+          </p:cNvSpPr>
+          <p:nvPr>
+            <p:ph type="body" idx="1"/>
+          </p:nvPr>
+        </p:nvSpPr>
+        <p:spPr/>
+        <p:txBody>
+          <a:bodyPr/>
+          <a:lstStyle/>
+          <a:p>
+            <a:r>
+              <a:rPr lang="de-DE" dirty="0"/>
+              <a:t>Folie zu erklären was machen Walzen überhaupt? Was ist das?</a:t>
+            </a:r>
+          </a:p>
+        </p:txBody>
+      </p:sp>
+      <p:sp>
+        <p:nvSpPr>
+          <p:cNvPr id="4" name="Foliennummernplatzhalter 3"/>
+          <p:cNvSpPr>
+            <a:spLocks noGrp="1"/>
+          </p:cNvSpPr>
+          <p:nvPr>
+            <p:ph type="sldNum" sz="quarter" idx="5"/>
+          </p:nvPr>
+        </p:nvSpPr>
+        <p:spPr/>
+        <p:txBody>
+          <a:bodyPr/>
+          <a:lstStyle/>
+          <a:p>
+            <a:fld id="{7019B76D-A09E-4559-8E19-D159EA5CA74D}" type="slidenum">
+              <a:rPr lang="de-DE" smtClean="0"/>
+              <a:t>13</a:t>
             </a:fld>
             <a:endParaRPr lang="de-DE"/>
           </a:p>
@@ -13369,7 +13632,7 @@
           <a:p>
             <a:fld id="{CE800001-F7EE-47B6-A215-BCA6054410BA}" type="datetimeFigureOut">
               <a:rPr lang="de-DE" smtClean="0"/>
-              <a:t>02.07.2024</a:t>
+              <a:t>04.07.2024</a:t>
             </a:fld>
             <a:endParaRPr lang="de-DE"/>
           </a:p>
@@ -13567,7 +13830,7 @@
           <a:p>
             <a:fld id="{CE800001-F7EE-47B6-A215-BCA6054410BA}" type="datetimeFigureOut">
               <a:rPr lang="de-DE" smtClean="0"/>
-              <a:t>02.07.2024</a:t>
+              <a:t>04.07.2024</a:t>
             </a:fld>
             <a:endParaRPr lang="de-DE"/>
           </a:p>
@@ -13775,7 +14038,7 @@
           <a:p>
             <a:fld id="{CE800001-F7EE-47B6-A215-BCA6054410BA}" type="datetimeFigureOut">
               <a:rPr lang="de-DE" smtClean="0"/>
-              <a:t>02.07.2024</a:t>
+              <a:t>04.07.2024</a:t>
             </a:fld>
             <a:endParaRPr lang="de-DE"/>
           </a:p>
@@ -13973,7 +14236,7 @@
           <a:p>
             <a:fld id="{CE800001-F7EE-47B6-A215-BCA6054410BA}" type="datetimeFigureOut">
               <a:rPr lang="de-DE" smtClean="0"/>
-              <a:t>02.07.2024</a:t>
+              <a:t>04.07.2024</a:t>
             </a:fld>
             <a:endParaRPr lang="de-DE"/>
           </a:p>
@@ -14248,7 +14511,7 @@
           <a:p>
             <a:fld id="{CE800001-F7EE-47B6-A215-BCA6054410BA}" type="datetimeFigureOut">
               <a:rPr lang="de-DE" smtClean="0"/>
-              <a:t>02.07.2024</a:t>
+              <a:t>04.07.2024</a:t>
             </a:fld>
             <a:endParaRPr lang="de-DE"/>
           </a:p>
@@ -14513,7 +14776,7 @@
           <a:p>
             <a:fld id="{CE800001-F7EE-47B6-A215-BCA6054410BA}" type="datetimeFigureOut">
               <a:rPr lang="de-DE" smtClean="0"/>
-              <a:t>02.07.2024</a:t>
+              <a:t>04.07.2024</a:t>
             </a:fld>
             <a:endParaRPr lang="de-DE"/>
           </a:p>
@@ -14925,7 +15188,7 @@
           <a:p>
             <a:fld id="{CE800001-F7EE-47B6-A215-BCA6054410BA}" type="datetimeFigureOut">
               <a:rPr lang="de-DE" smtClean="0"/>
-              <a:t>02.07.2024</a:t>
+              <a:t>04.07.2024</a:t>
             </a:fld>
             <a:endParaRPr lang="de-DE"/>
           </a:p>
@@ -15066,7 +15329,7 @@
           <a:p>
             <a:fld id="{CE800001-F7EE-47B6-A215-BCA6054410BA}" type="datetimeFigureOut">
               <a:rPr lang="de-DE" smtClean="0"/>
-              <a:t>02.07.2024</a:t>
+              <a:t>04.07.2024</a:t>
             </a:fld>
             <a:endParaRPr lang="de-DE"/>
           </a:p>
@@ -15179,7 +15442,7 @@
           <a:p>
             <a:fld id="{CE800001-F7EE-47B6-A215-BCA6054410BA}" type="datetimeFigureOut">
               <a:rPr lang="de-DE" smtClean="0"/>
-              <a:t>02.07.2024</a:t>
+              <a:t>04.07.2024</a:t>
             </a:fld>
             <a:endParaRPr lang="de-DE"/>
           </a:p>
@@ -15490,7 +15753,7 @@
           <a:p>
             <a:fld id="{CE800001-F7EE-47B6-A215-BCA6054410BA}" type="datetimeFigureOut">
               <a:rPr lang="de-DE" smtClean="0"/>
-              <a:t>02.07.2024</a:t>
+              <a:t>04.07.2024</a:t>
             </a:fld>
             <a:endParaRPr lang="de-DE"/>
           </a:p>
@@ -15778,7 +16041,7 @@
           <a:p>
             <a:fld id="{CE800001-F7EE-47B6-A215-BCA6054410BA}" type="datetimeFigureOut">
               <a:rPr lang="de-DE" smtClean="0"/>
-              <a:t>02.07.2024</a:t>
+              <a:t>04.07.2024</a:t>
             </a:fld>
             <a:endParaRPr lang="de-DE"/>
           </a:p>
@@ -16019,7 +16282,7 @@
           <a:p>
             <a:fld id="{CE800001-F7EE-47B6-A215-BCA6054410BA}" type="datetimeFigureOut">
               <a:rPr lang="de-DE" smtClean="0"/>
-              <a:t>02.07.2024</a:t>
+              <a:t>04.07.2024</a:t>
             </a:fld>
             <a:endParaRPr lang="de-DE"/>
           </a:p>
@@ -16615,7 +16878,7 @@
         <p:spPr>
           <a:xfrm>
             <a:off x="10763801" y="6320552"/>
-            <a:ext cx="1396536" cy="369332"/>
+            <a:ext cx="1455848" cy="369332"/>
           </a:xfrm>
           <a:prstGeom prst="rect">
             <a:avLst/>
@@ -16635,7 +16898,7 @@
                 </a:solidFill>
                 <a:latin typeface="Montserrat" panose="02000505000000020004" pitchFamily="2" charset="0"/>
               </a:rPr>
-              <a:t>14.06.2024</a:t>
+              <a:t>04.07.2024</a:t>
             </a:r>
           </a:p>
         </p:txBody>
@@ -16703,6 +16966,778 @@
 </file>
 
 <file path=ppt/slides/slide10.xml><?xml version="1.0" encoding="utf-8"?>
+<p:sld xmlns:a="http://schemas.openxmlformats.org/drawingml/2006/main" xmlns:r="http://schemas.openxmlformats.org/officeDocument/2006/relationships" xmlns:p="http://schemas.openxmlformats.org/presentationml/2006/main">
+  <p:cSld>
+    <p:bg>
+      <p:bgPr>
+        <a:solidFill>
+          <a:srgbClr val="F8F8F8"/>
+        </a:solidFill>
+        <a:effectLst/>
+      </p:bgPr>
+    </p:bg>
+    <p:spTree>
+      <p:nvGrpSpPr>
+        <p:cNvPr id="1" name=""/>
+        <p:cNvGrpSpPr/>
+        <p:nvPr/>
+      </p:nvGrpSpPr>
+      <p:grpSpPr>
+        <a:xfrm>
+          <a:off x="0" y="0"/>
+          <a:ext cx="0" cy="0"/>
+          <a:chOff x="0" y="0"/>
+          <a:chExt cx="0" cy="0"/>
+        </a:xfrm>
+      </p:grpSpPr>
+      <p:pic>
+        <p:nvPicPr>
+          <p:cNvPr id="13" name="Grafik 12" descr="Ein Bild, das Schrift, Screenshot, Grafiken, Text enthält.&#10;&#10;Automatisch generierte Beschreibung">
+            <a:extLst>
+              <a:ext uri="{FF2B5EF4-FFF2-40B4-BE49-F238E27FC236}">
+                <a16:creationId xmlns:a16="http://schemas.microsoft.com/office/drawing/2014/main" id="{CEFD0BAA-CD64-1295-D48F-2145AC9083DE}"/>
+              </a:ext>
+            </a:extLst>
+          </p:cNvPr>
+          <p:cNvPicPr>
+            <a:picLocks noChangeAspect="1"/>
+          </p:cNvPicPr>
+          <p:nvPr/>
+        </p:nvPicPr>
+        <p:blipFill>
+          <a:blip r:embed="rId3">
+            <a:extLst>
+              <a:ext uri="{28A0092B-C50C-407E-A947-70E740481C1C}">
+                <a14:useLocalDpi xmlns:a14="http://schemas.microsoft.com/office/drawing/2010/main" val="0"/>
+              </a:ext>
+            </a:extLst>
+          </a:blip>
+          <a:stretch>
+            <a:fillRect/>
+          </a:stretch>
+        </p:blipFill>
+        <p:spPr>
+          <a:xfrm>
+            <a:off x="53340" y="6121261"/>
+            <a:ext cx="2072640" cy="666699"/>
+          </a:xfrm>
+          <a:prstGeom prst="rect">
+            <a:avLst/>
+          </a:prstGeom>
+        </p:spPr>
+      </p:pic>
+      <p:sp>
+        <p:nvSpPr>
+          <p:cNvPr id="2" name="Textfeld 1">
+            <a:extLst>
+              <a:ext uri="{FF2B5EF4-FFF2-40B4-BE49-F238E27FC236}">
+                <a16:creationId xmlns:a16="http://schemas.microsoft.com/office/drawing/2014/main" id="{B1C4A887-EA94-0AB4-2651-9A81FFB43401}"/>
+              </a:ext>
+            </a:extLst>
+          </p:cNvPr>
+          <p:cNvSpPr txBox="1"/>
+          <p:nvPr/>
+        </p:nvSpPr>
+        <p:spPr>
+          <a:xfrm>
+            <a:off x="571500" y="483256"/>
+            <a:ext cx="3550972" cy="584775"/>
+          </a:xfrm>
+          <a:prstGeom prst="rect">
+            <a:avLst/>
+          </a:prstGeom>
+          <a:noFill/>
+        </p:spPr>
+        <p:txBody>
+          <a:bodyPr wrap="none" rtlCol="0">
+            <a:spAutoFit/>
+          </a:bodyPr>
+          <a:lstStyle/>
+          <a:p>
+            <a:r>
+              <a:rPr lang="de-DE" sz="3200" b="1" dirty="0">
+                <a:solidFill>
+                  <a:srgbClr val="050410"/>
+                </a:solidFill>
+                <a:latin typeface="Montserrat" panose="02000505000000020004" pitchFamily="2" charset="0"/>
+              </a:rPr>
+              <a:t>Zusammenhang</a:t>
+            </a:r>
+            <a:endParaRPr lang="de-DE" b="1" dirty="0">
+              <a:solidFill>
+                <a:srgbClr val="050410"/>
+              </a:solidFill>
+              <a:latin typeface="Montserrat" panose="02000505000000020004" pitchFamily="2" charset="0"/>
+            </a:endParaRPr>
+          </a:p>
+        </p:txBody>
+      </p:sp>
+      <p:sp>
+        <p:nvSpPr>
+          <p:cNvPr id="3" name="Ellipse 2">
+            <a:extLst>
+              <a:ext uri="{FF2B5EF4-FFF2-40B4-BE49-F238E27FC236}">
+                <a16:creationId xmlns:a16="http://schemas.microsoft.com/office/drawing/2014/main" id="{571C40CA-3129-1673-F271-B68099B4F19F}"/>
+              </a:ext>
+            </a:extLst>
+          </p:cNvPr>
+          <p:cNvSpPr/>
+          <p:nvPr/>
+        </p:nvSpPr>
+        <p:spPr>
+          <a:xfrm>
+            <a:off x="453941" y="714667"/>
+            <a:ext cx="121953" cy="121953"/>
+          </a:xfrm>
+          <a:prstGeom prst="ellipse">
+            <a:avLst/>
+          </a:prstGeom>
+          <a:noFill/>
+          <a:ln w="57150">
+            <a:solidFill>
+              <a:srgbClr val="3B28CC"/>
+            </a:solidFill>
+          </a:ln>
+        </p:spPr>
+        <p:style>
+          <a:lnRef idx="2">
+            <a:schemeClr val="accent1">
+              <a:shade val="15000"/>
+            </a:schemeClr>
+          </a:lnRef>
+          <a:fillRef idx="1">
+            <a:schemeClr val="accent1"/>
+          </a:fillRef>
+          <a:effectRef idx="0">
+            <a:schemeClr val="accent1"/>
+          </a:effectRef>
+          <a:fontRef idx="minor">
+            <a:schemeClr val="lt1"/>
+          </a:fontRef>
+        </p:style>
+        <p:txBody>
+          <a:bodyPr rtlCol="0" anchor="ctr"/>
+          <a:lstStyle/>
+          <a:p>
+            <a:pPr algn="ctr"/>
+            <a:endParaRPr lang="de-DE"/>
+          </a:p>
+        </p:txBody>
+      </p:sp>
+      <p:pic>
+        <p:nvPicPr>
+          <p:cNvPr id="4" name="Picture 2">
+            <a:extLst>
+              <a:ext uri="{FF2B5EF4-FFF2-40B4-BE49-F238E27FC236}">
+                <a16:creationId xmlns:a16="http://schemas.microsoft.com/office/drawing/2014/main" id="{E89EFA89-0532-2F73-C663-01E8AEFDDB19}"/>
+              </a:ext>
+            </a:extLst>
+          </p:cNvPr>
+          <p:cNvPicPr>
+            <a:picLocks noChangeAspect="1" noChangeArrowheads="1"/>
+          </p:cNvPicPr>
+          <p:nvPr/>
+        </p:nvPicPr>
+        <p:blipFill rotWithShape="1">
+          <a:blip r:embed="rId4">
+            <a:clrChange>
+              <a:clrFrom>
+                <a:srgbClr val="FFFFFF"/>
+              </a:clrFrom>
+              <a:clrTo>
+                <a:srgbClr val="FFFFFF">
+                  <a:alpha val="0"/>
+                </a:srgbClr>
+              </a:clrTo>
+            </a:clrChange>
+            <a:extLst>
+              <a:ext uri="{28A0092B-C50C-407E-A947-70E740481C1C}">
+                <a14:useLocalDpi xmlns:a14="http://schemas.microsoft.com/office/drawing/2010/main" val="0"/>
+              </a:ext>
+            </a:extLst>
+          </a:blip>
+          <a:srcRect l="40220" r="1201"/>
+          <a:stretch/>
+        </p:blipFill>
+        <p:spPr bwMode="auto">
+          <a:xfrm>
+            <a:off x="1296538" y="1308645"/>
+            <a:ext cx="3991970" cy="4941171"/>
+          </a:xfrm>
+          <a:prstGeom prst="rect">
+            <a:avLst/>
+          </a:prstGeom>
+          <a:noFill/>
+          <a:extLst>
+            <a:ext uri="{909E8E84-426E-40DD-AFC4-6F175D3DCCD1}">
+              <a14:hiddenFill xmlns:a14="http://schemas.microsoft.com/office/drawing/2010/main">
+                <a:solidFill>
+                  <a:srgbClr val="FFFFFF"/>
+                </a:solidFill>
+              </a14:hiddenFill>
+            </a:ext>
+          </a:extLst>
+        </p:spPr>
+      </p:pic>
+      <p:pic>
+        <p:nvPicPr>
+          <p:cNvPr id="6" name="Picture 2">
+            <a:extLst>
+              <a:ext uri="{FF2B5EF4-FFF2-40B4-BE49-F238E27FC236}">
+                <a16:creationId xmlns:a16="http://schemas.microsoft.com/office/drawing/2014/main" id="{92E1CEC7-C0ED-571E-6D73-4A14665BCB59}"/>
+              </a:ext>
+            </a:extLst>
+          </p:cNvPr>
+          <p:cNvPicPr>
+            <a:picLocks noChangeAspect="1" noChangeArrowheads="1"/>
+          </p:cNvPicPr>
+          <p:nvPr/>
+        </p:nvPicPr>
+        <p:blipFill rotWithShape="1">
+          <a:blip r:embed="rId5">
+            <a:clrChange>
+              <a:clrFrom>
+                <a:srgbClr val="FFFFFF"/>
+              </a:clrFrom>
+              <a:clrTo>
+                <a:srgbClr val="FFFFFF">
+                  <a:alpha val="0"/>
+                </a:srgbClr>
+              </a:clrTo>
+            </a:clrChange>
+            <a:extLst>
+              <a:ext uri="{28A0092B-C50C-407E-A947-70E740481C1C}">
+                <a14:useLocalDpi xmlns:a14="http://schemas.microsoft.com/office/drawing/2010/main" val="0"/>
+              </a:ext>
+            </a:extLst>
+          </a:blip>
+          <a:srcRect l="70893" b="53903"/>
+          <a:stretch/>
+        </p:blipFill>
+        <p:spPr bwMode="auto">
+          <a:xfrm>
+            <a:off x="7198155" y="1893420"/>
+            <a:ext cx="4057015" cy="3497081"/>
+          </a:xfrm>
+          <a:prstGeom prst="rect">
+            <a:avLst/>
+          </a:prstGeom>
+          <a:noFill/>
+          <a:extLst>
+            <a:ext uri="{909E8E84-426E-40DD-AFC4-6F175D3DCCD1}">
+              <a14:hiddenFill xmlns:a14="http://schemas.microsoft.com/office/drawing/2010/main">
+                <a:solidFill>
+                  <a:srgbClr val="FFFFFF"/>
+                </a:solidFill>
+              </a14:hiddenFill>
+            </a:ext>
+          </a:extLst>
+        </p:spPr>
+      </p:pic>
+      <p:sp>
+        <p:nvSpPr>
+          <p:cNvPr id="7" name="Textfeld 6">
+            <a:extLst>
+              <a:ext uri="{FF2B5EF4-FFF2-40B4-BE49-F238E27FC236}">
+                <a16:creationId xmlns:a16="http://schemas.microsoft.com/office/drawing/2014/main" id="{473C2193-EF1E-C733-67F4-D8A562E198CE}"/>
+              </a:ext>
+            </a:extLst>
+          </p:cNvPr>
+          <p:cNvSpPr txBox="1"/>
+          <p:nvPr/>
+        </p:nvSpPr>
+        <p:spPr>
+          <a:xfrm>
+            <a:off x="1420297" y="1266760"/>
+            <a:ext cx="1923925" cy="584775"/>
+          </a:xfrm>
+          <a:prstGeom prst="rect">
+            <a:avLst/>
+          </a:prstGeom>
+          <a:noFill/>
+        </p:spPr>
+        <p:txBody>
+          <a:bodyPr wrap="none" rtlCol="0">
+            <a:spAutoFit/>
+          </a:bodyPr>
+          <a:lstStyle/>
+          <a:p>
+            <a:r>
+              <a:rPr lang="de-DE" sz="3200" b="1" dirty="0">
+                <a:solidFill>
+                  <a:srgbClr val="FFC000"/>
+                </a:solidFill>
+                <a:latin typeface="Montserrat" panose="02000505000000020004" pitchFamily="2" charset="0"/>
+              </a:rPr>
+              <a:t>Fachlich</a:t>
+            </a:r>
+            <a:endParaRPr lang="de-DE" b="1" dirty="0">
+              <a:solidFill>
+                <a:srgbClr val="FFC000"/>
+              </a:solidFill>
+              <a:latin typeface="Montserrat" panose="02000505000000020004" pitchFamily="2" charset="0"/>
+            </a:endParaRPr>
+          </a:p>
+        </p:txBody>
+      </p:sp>
+      <p:sp>
+        <p:nvSpPr>
+          <p:cNvPr id="8" name="Textfeld 7">
+            <a:extLst>
+              <a:ext uri="{FF2B5EF4-FFF2-40B4-BE49-F238E27FC236}">
+                <a16:creationId xmlns:a16="http://schemas.microsoft.com/office/drawing/2014/main" id="{7AF211E1-A447-9643-9ECF-998431B913B0}"/>
+              </a:ext>
+            </a:extLst>
+          </p:cNvPr>
+          <p:cNvSpPr txBox="1"/>
+          <p:nvPr/>
+        </p:nvSpPr>
+        <p:spPr>
+          <a:xfrm>
+            <a:off x="8197555" y="1266760"/>
+            <a:ext cx="2287806" cy="584775"/>
+          </a:xfrm>
+          <a:prstGeom prst="rect">
+            <a:avLst/>
+          </a:prstGeom>
+          <a:noFill/>
+        </p:spPr>
+        <p:txBody>
+          <a:bodyPr wrap="none" rtlCol="0">
+            <a:spAutoFit/>
+          </a:bodyPr>
+          <a:lstStyle/>
+          <a:p>
+            <a:r>
+              <a:rPr lang="de-DE" sz="3200" b="1" dirty="0">
+                <a:solidFill>
+                  <a:srgbClr val="0070C0"/>
+                </a:solidFill>
+                <a:latin typeface="Montserrat" panose="02000505000000020004" pitchFamily="2" charset="0"/>
+              </a:rPr>
+              <a:t>Technisch</a:t>
+            </a:r>
+            <a:endParaRPr lang="de-DE" b="1" dirty="0">
+              <a:solidFill>
+                <a:srgbClr val="0070C0"/>
+              </a:solidFill>
+              <a:latin typeface="Montserrat" panose="02000505000000020004" pitchFamily="2" charset="0"/>
+            </a:endParaRPr>
+          </a:p>
+        </p:txBody>
+      </p:sp>
+    </p:spTree>
+    <p:extLst>
+      <p:ext uri="{BB962C8B-B14F-4D97-AF65-F5344CB8AC3E}">
+        <p14:creationId xmlns:p14="http://schemas.microsoft.com/office/powerpoint/2010/main" val="2723073992"/>
+      </p:ext>
+    </p:extLst>
+  </p:cSld>
+  <p:clrMapOvr>
+    <a:masterClrMapping/>
+  </p:clrMapOvr>
+  <mc:AlternateContent xmlns:mc="http://schemas.openxmlformats.org/markup-compatibility/2006" xmlns:p159="http://schemas.microsoft.com/office/powerpoint/2015/09/main">
+    <mc:Choice Requires="p159">
+      <p:transition xmlns:p14="http://schemas.microsoft.com/office/powerpoint/2010/main" spd="slow" p14:dur="2000">
+        <p159:morph option="byObject"/>
+      </p:transition>
+    </mc:Choice>
+    <mc:Fallback xmlns="">
+      <p:transition spd="slow">
+        <p:fade/>
+      </p:transition>
+    </mc:Fallback>
+  </mc:AlternateContent>
+</p:sld>
+</file>
+
+<file path=ppt/slides/slide11.xml><?xml version="1.0" encoding="utf-8"?>
+<p:sld xmlns:a="http://schemas.openxmlformats.org/drawingml/2006/main" xmlns:r="http://schemas.openxmlformats.org/officeDocument/2006/relationships" xmlns:p="http://schemas.openxmlformats.org/presentationml/2006/main">
+  <p:cSld>
+    <p:bg>
+      <p:bgPr>
+        <a:solidFill>
+          <a:srgbClr val="F8F8F8"/>
+        </a:solidFill>
+        <a:effectLst/>
+      </p:bgPr>
+    </p:bg>
+    <p:spTree>
+      <p:nvGrpSpPr>
+        <p:cNvPr id="1" name=""/>
+        <p:cNvGrpSpPr/>
+        <p:nvPr/>
+      </p:nvGrpSpPr>
+      <p:grpSpPr>
+        <a:xfrm>
+          <a:off x="0" y="0"/>
+          <a:ext cx="0" cy="0"/>
+          <a:chOff x="0" y="0"/>
+          <a:chExt cx="0" cy="0"/>
+        </a:xfrm>
+      </p:grpSpPr>
+      <p:pic>
+        <p:nvPicPr>
+          <p:cNvPr id="6" name="Picture 2">
+            <a:extLst>
+              <a:ext uri="{FF2B5EF4-FFF2-40B4-BE49-F238E27FC236}">
+                <a16:creationId xmlns:a16="http://schemas.microsoft.com/office/drawing/2014/main" id="{133EB1CF-175E-6D1B-A6AA-AD0AD93CFA1C}"/>
+              </a:ext>
+            </a:extLst>
+          </p:cNvPr>
+          <p:cNvPicPr>
+            <a:picLocks noChangeAspect="1" noChangeArrowheads="1"/>
+          </p:cNvPicPr>
+          <p:nvPr/>
+        </p:nvPicPr>
+        <p:blipFill rotWithShape="1">
+          <a:blip r:embed="rId3">
+            <a:clrChange>
+              <a:clrFrom>
+                <a:srgbClr val="FFFFFF"/>
+              </a:clrFrom>
+              <a:clrTo>
+                <a:srgbClr val="FFFFFF">
+                  <a:alpha val="0"/>
+                </a:srgbClr>
+              </a:clrTo>
+            </a:clrChange>
+            <a:extLst>
+              <a:ext uri="{28A0092B-C50C-407E-A947-70E740481C1C}">
+                <a14:useLocalDpi xmlns:a14="http://schemas.microsoft.com/office/drawing/2010/main" val="0"/>
+              </a:ext>
+            </a:extLst>
+          </a:blip>
+          <a:srcRect l="21265" r="30001"/>
+          <a:stretch/>
+        </p:blipFill>
+        <p:spPr bwMode="auto">
+          <a:xfrm>
+            <a:off x="4761402" y="1498972"/>
+            <a:ext cx="4527933" cy="4730208"/>
+          </a:xfrm>
+          <a:prstGeom prst="rect">
+            <a:avLst/>
+          </a:prstGeom>
+          <a:noFill/>
+          <a:extLst>
+            <a:ext uri="{909E8E84-426E-40DD-AFC4-6F175D3DCCD1}">
+              <a14:hiddenFill xmlns:a14="http://schemas.microsoft.com/office/drawing/2010/main">
+                <a:solidFill>
+                  <a:srgbClr val="FFFFFF"/>
+                </a:solidFill>
+              </a14:hiddenFill>
+            </a:ext>
+          </a:extLst>
+        </p:spPr>
+      </p:pic>
+      <p:pic>
+        <p:nvPicPr>
+          <p:cNvPr id="13" name="Grafik 12" descr="Ein Bild, das Schrift, Screenshot, Grafiken, Text enthält.&#10;&#10;Automatisch generierte Beschreibung">
+            <a:extLst>
+              <a:ext uri="{FF2B5EF4-FFF2-40B4-BE49-F238E27FC236}">
+                <a16:creationId xmlns:a16="http://schemas.microsoft.com/office/drawing/2014/main" id="{CEFD0BAA-CD64-1295-D48F-2145AC9083DE}"/>
+              </a:ext>
+            </a:extLst>
+          </p:cNvPr>
+          <p:cNvPicPr>
+            <a:picLocks noChangeAspect="1"/>
+          </p:cNvPicPr>
+          <p:nvPr/>
+        </p:nvPicPr>
+        <p:blipFill>
+          <a:blip r:embed="rId4">
+            <a:extLst>
+              <a:ext uri="{28A0092B-C50C-407E-A947-70E740481C1C}">
+                <a14:useLocalDpi xmlns:a14="http://schemas.microsoft.com/office/drawing/2010/main" val="0"/>
+              </a:ext>
+            </a:extLst>
+          </a:blip>
+          <a:stretch>
+            <a:fillRect/>
+          </a:stretch>
+        </p:blipFill>
+        <p:spPr>
+          <a:xfrm>
+            <a:off x="53340" y="6121261"/>
+            <a:ext cx="2072640" cy="666699"/>
+          </a:xfrm>
+          <a:prstGeom prst="rect">
+            <a:avLst/>
+          </a:prstGeom>
+        </p:spPr>
+      </p:pic>
+      <p:sp>
+        <p:nvSpPr>
+          <p:cNvPr id="2" name="Textfeld 1">
+            <a:extLst>
+              <a:ext uri="{FF2B5EF4-FFF2-40B4-BE49-F238E27FC236}">
+                <a16:creationId xmlns:a16="http://schemas.microsoft.com/office/drawing/2014/main" id="{B1C4A887-EA94-0AB4-2651-9A81FFB43401}"/>
+              </a:ext>
+            </a:extLst>
+          </p:cNvPr>
+          <p:cNvSpPr txBox="1"/>
+          <p:nvPr/>
+        </p:nvSpPr>
+        <p:spPr>
+          <a:xfrm>
+            <a:off x="571500" y="483256"/>
+            <a:ext cx="3550972" cy="584775"/>
+          </a:xfrm>
+          <a:prstGeom prst="rect">
+            <a:avLst/>
+          </a:prstGeom>
+          <a:noFill/>
+        </p:spPr>
+        <p:txBody>
+          <a:bodyPr wrap="none" rtlCol="0">
+            <a:spAutoFit/>
+          </a:bodyPr>
+          <a:lstStyle/>
+          <a:p>
+            <a:r>
+              <a:rPr lang="de-DE" sz="3200" b="1" dirty="0">
+                <a:solidFill>
+                  <a:srgbClr val="050410"/>
+                </a:solidFill>
+                <a:latin typeface="Montserrat" panose="02000505000000020004" pitchFamily="2" charset="0"/>
+              </a:rPr>
+              <a:t>Zusammenhang</a:t>
+            </a:r>
+            <a:endParaRPr lang="de-DE" b="1" dirty="0">
+              <a:solidFill>
+                <a:srgbClr val="050410"/>
+              </a:solidFill>
+              <a:latin typeface="Montserrat" panose="02000505000000020004" pitchFamily="2" charset="0"/>
+            </a:endParaRPr>
+          </a:p>
+        </p:txBody>
+      </p:sp>
+      <p:sp>
+        <p:nvSpPr>
+          <p:cNvPr id="3" name="Ellipse 2">
+            <a:extLst>
+              <a:ext uri="{FF2B5EF4-FFF2-40B4-BE49-F238E27FC236}">
+                <a16:creationId xmlns:a16="http://schemas.microsoft.com/office/drawing/2014/main" id="{571C40CA-3129-1673-F271-B68099B4F19F}"/>
+              </a:ext>
+            </a:extLst>
+          </p:cNvPr>
+          <p:cNvSpPr/>
+          <p:nvPr/>
+        </p:nvSpPr>
+        <p:spPr>
+          <a:xfrm>
+            <a:off x="453941" y="714667"/>
+            <a:ext cx="121953" cy="121953"/>
+          </a:xfrm>
+          <a:prstGeom prst="ellipse">
+            <a:avLst/>
+          </a:prstGeom>
+          <a:noFill/>
+          <a:ln w="57150">
+            <a:solidFill>
+              <a:srgbClr val="3B28CC"/>
+            </a:solidFill>
+          </a:ln>
+        </p:spPr>
+        <p:style>
+          <a:lnRef idx="2">
+            <a:schemeClr val="accent1">
+              <a:shade val="15000"/>
+            </a:schemeClr>
+          </a:lnRef>
+          <a:fillRef idx="1">
+            <a:schemeClr val="accent1"/>
+          </a:fillRef>
+          <a:effectRef idx="0">
+            <a:schemeClr val="accent1"/>
+          </a:effectRef>
+          <a:fontRef idx="minor">
+            <a:schemeClr val="lt1"/>
+          </a:fontRef>
+        </p:style>
+        <p:txBody>
+          <a:bodyPr rtlCol="0" anchor="ctr"/>
+          <a:lstStyle/>
+          <a:p>
+            <a:pPr algn="ctr"/>
+            <a:endParaRPr lang="de-DE"/>
+          </a:p>
+        </p:txBody>
+      </p:sp>
+      <p:pic>
+        <p:nvPicPr>
+          <p:cNvPr id="5" name="Picture 2">
+            <a:extLst>
+              <a:ext uri="{FF2B5EF4-FFF2-40B4-BE49-F238E27FC236}">
+                <a16:creationId xmlns:a16="http://schemas.microsoft.com/office/drawing/2014/main" id="{FF1A0E1F-7994-4847-E2B3-982DF7142814}"/>
+              </a:ext>
+            </a:extLst>
+          </p:cNvPr>
+          <p:cNvPicPr>
+            <a:picLocks noChangeAspect="1" noChangeArrowheads="1"/>
+          </p:cNvPicPr>
+          <p:nvPr/>
+        </p:nvPicPr>
+        <p:blipFill rotWithShape="1">
+          <a:blip r:embed="rId5">
+            <a:clrChange>
+              <a:clrFrom>
+                <a:srgbClr val="FFFFFF"/>
+              </a:clrFrom>
+              <a:clrTo>
+                <a:srgbClr val="FFFFFF">
+                  <a:alpha val="0"/>
+                </a:srgbClr>
+              </a:clrTo>
+            </a:clrChange>
+            <a:extLst>
+              <a:ext uri="{28A0092B-C50C-407E-A947-70E740481C1C}">
+                <a14:useLocalDpi xmlns:a14="http://schemas.microsoft.com/office/drawing/2010/main" val="0"/>
+              </a:ext>
+            </a:extLst>
+          </a:blip>
+          <a:srcRect r="65989"/>
+          <a:stretch/>
+        </p:blipFill>
+        <p:spPr bwMode="auto">
+          <a:xfrm>
+            <a:off x="1563824" y="1851535"/>
+            <a:ext cx="1813046" cy="3865182"/>
+          </a:xfrm>
+          <a:prstGeom prst="rect">
+            <a:avLst/>
+          </a:prstGeom>
+          <a:noFill/>
+          <a:extLst>
+            <a:ext uri="{909E8E84-426E-40DD-AFC4-6F175D3DCCD1}">
+              <a14:hiddenFill xmlns:a14="http://schemas.microsoft.com/office/drawing/2010/main">
+                <a:solidFill>
+                  <a:srgbClr val="FFFFFF"/>
+                </a:solidFill>
+              </a14:hiddenFill>
+            </a:ext>
+          </a:extLst>
+        </p:spPr>
+      </p:pic>
+      <p:sp>
+        <p:nvSpPr>
+          <p:cNvPr id="9" name="Textfeld 8">
+            <a:extLst>
+              <a:ext uri="{FF2B5EF4-FFF2-40B4-BE49-F238E27FC236}">
+                <a16:creationId xmlns:a16="http://schemas.microsoft.com/office/drawing/2014/main" id="{C6CCD798-5575-F1BF-13FD-EBDFD3F42FD1}"/>
+              </a:ext>
+            </a:extLst>
+          </p:cNvPr>
+          <p:cNvSpPr txBox="1"/>
+          <p:nvPr/>
+        </p:nvSpPr>
+        <p:spPr>
+          <a:xfrm>
+            <a:off x="1420297" y="1266760"/>
+            <a:ext cx="1923925" cy="584775"/>
+          </a:xfrm>
+          <a:prstGeom prst="rect">
+            <a:avLst/>
+          </a:prstGeom>
+          <a:noFill/>
+        </p:spPr>
+        <p:txBody>
+          <a:bodyPr wrap="none" rtlCol="0">
+            <a:spAutoFit/>
+          </a:bodyPr>
+          <a:lstStyle/>
+          <a:p>
+            <a:r>
+              <a:rPr lang="de-DE" sz="3200" b="1" dirty="0">
+                <a:solidFill>
+                  <a:srgbClr val="FFC000"/>
+                </a:solidFill>
+                <a:latin typeface="Montserrat" panose="02000505000000020004" pitchFamily="2" charset="0"/>
+              </a:rPr>
+              <a:t>Fachlich</a:t>
+            </a:r>
+            <a:endParaRPr lang="de-DE" b="1" dirty="0">
+              <a:solidFill>
+                <a:srgbClr val="FFC000"/>
+              </a:solidFill>
+              <a:latin typeface="Montserrat" panose="02000505000000020004" pitchFamily="2" charset="0"/>
+            </a:endParaRPr>
+          </a:p>
+        </p:txBody>
+      </p:sp>
+      <p:sp>
+        <p:nvSpPr>
+          <p:cNvPr id="10" name="Textfeld 9">
+            <a:extLst>
+              <a:ext uri="{FF2B5EF4-FFF2-40B4-BE49-F238E27FC236}">
+                <a16:creationId xmlns:a16="http://schemas.microsoft.com/office/drawing/2014/main" id="{58780E7A-22C8-C07C-43EE-E0A68B400FB5}"/>
+              </a:ext>
+            </a:extLst>
+          </p:cNvPr>
+          <p:cNvSpPr txBox="1"/>
+          <p:nvPr/>
+        </p:nvSpPr>
+        <p:spPr>
+          <a:xfrm>
+            <a:off x="4952097" y="1381817"/>
+            <a:ext cx="2287806" cy="584775"/>
+          </a:xfrm>
+          <a:prstGeom prst="rect">
+            <a:avLst/>
+          </a:prstGeom>
+          <a:noFill/>
+        </p:spPr>
+        <p:txBody>
+          <a:bodyPr wrap="none" rtlCol="0">
+            <a:spAutoFit/>
+          </a:bodyPr>
+          <a:lstStyle/>
+          <a:p>
+            <a:r>
+              <a:rPr lang="de-DE" sz="3200" b="1" dirty="0">
+                <a:solidFill>
+                  <a:srgbClr val="0070C0"/>
+                </a:solidFill>
+                <a:latin typeface="Montserrat" panose="02000505000000020004" pitchFamily="2" charset="0"/>
+              </a:rPr>
+              <a:t>Technisch</a:t>
+            </a:r>
+            <a:endParaRPr lang="de-DE" b="1" dirty="0">
+              <a:solidFill>
+                <a:srgbClr val="0070C0"/>
+              </a:solidFill>
+              <a:latin typeface="Montserrat" panose="02000505000000020004" pitchFamily="2" charset="0"/>
+            </a:endParaRPr>
+          </a:p>
+        </p:txBody>
+      </p:sp>
+    </p:spTree>
+    <p:extLst>
+      <p:ext uri="{BB962C8B-B14F-4D97-AF65-F5344CB8AC3E}">
+        <p14:creationId xmlns:p14="http://schemas.microsoft.com/office/powerpoint/2010/main" val="834382877"/>
+      </p:ext>
+    </p:extLst>
+  </p:cSld>
+  <p:clrMapOvr>
+    <a:masterClrMapping/>
+  </p:clrMapOvr>
+  <mc:AlternateContent xmlns:mc="http://schemas.openxmlformats.org/markup-compatibility/2006" xmlns:p159="http://schemas.microsoft.com/office/powerpoint/2015/09/main">
+    <mc:Choice Requires="p159">
+      <p:transition xmlns:p14="http://schemas.microsoft.com/office/powerpoint/2010/main" spd="slow" p14:dur="2000">
+        <p159:morph option="byObject"/>
+      </p:transition>
+    </mc:Choice>
+    <mc:Fallback xmlns="">
+      <p:transition spd="slow">
+        <p:fade/>
+      </p:transition>
+    </mc:Fallback>
+  </mc:AlternateContent>
+</p:sld>
+</file>
+
+<file path=ppt/slides/slide12.xml><?xml version="1.0" encoding="utf-8"?>
 <p:sld xmlns:a="http://schemas.openxmlformats.org/drawingml/2006/main" xmlns:r="http://schemas.openxmlformats.org/officeDocument/2006/relationships" xmlns:p="http://schemas.openxmlformats.org/presentationml/2006/main">
   <p:cSld>
     <p:spTree>
@@ -17197,7 +18232,7 @@
 </p:sld>
 </file>
 
-<file path=ppt/slides/slide11.xml><?xml version="1.0" encoding="utf-8"?>
+<file path=ppt/slides/slide13.xml><?xml version="1.0" encoding="utf-8"?>
 <p:sld xmlns:a="http://schemas.openxmlformats.org/drawingml/2006/main" xmlns:r="http://schemas.openxmlformats.org/officeDocument/2006/relationships" xmlns:p="http://schemas.openxmlformats.org/presentationml/2006/main" show="0">
   <p:cSld>
     <p:bg>
@@ -18008,7 +19043,7 @@
         <p:spPr>
           <a:xfrm>
             <a:off x="10763801" y="6320552"/>
-            <a:ext cx="1396536" cy="369332"/>
+            <a:ext cx="1455848" cy="369332"/>
           </a:xfrm>
           <a:prstGeom prst="rect">
             <a:avLst/>
@@ -18028,7 +19063,7 @@
                 </a:solidFill>
                 <a:latin typeface="Montserrat" panose="02000505000000020004" pitchFamily="2" charset="0"/>
               </a:rPr>
-              <a:t>14.06.2024</a:t>
+              <a:t>04.07.2024</a:t>
             </a:r>
           </a:p>
         </p:txBody>
@@ -19598,8 +20633,8 @@
         </p:nvSpPr>
         <p:spPr>
           <a:xfrm>
-            <a:off x="3785111" y="3258483"/>
-            <a:ext cx="4621778" cy="646331"/>
+            <a:off x="925354" y="3258483"/>
+            <a:ext cx="10341293" cy="646331"/>
           </a:xfrm>
           <a:prstGeom prst="rect">
             <a:avLst/>
@@ -19620,7 +20655,25 @@
                 </a:solidFill>
                 <a:latin typeface="Montserrat" panose="02000505000000020004" pitchFamily="2" charset="0"/>
               </a:rPr>
-              <a:t>Fachlicher Entwurf</a:t>
+              <a:t>Fachlicher Entwurf </a:t>
+            </a:r>
+            <a:r>
+              <a:rPr lang="de-DE" sz="3600" dirty="0">
+                <a:solidFill>
+                  <a:srgbClr val="050410"/>
+                </a:solidFill>
+                <a:latin typeface="Montserrat" panose="02000505000000020004" pitchFamily="2" charset="0"/>
+              </a:rPr>
+              <a:t>vs.</a:t>
+            </a:r>
+            <a:r>
+              <a:rPr lang="de-DE" sz="3600" b="1" dirty="0">
+                <a:solidFill>
+                  <a:srgbClr val="050410"/>
+                </a:solidFill>
+                <a:latin typeface="Montserrat" panose="02000505000000020004" pitchFamily="2" charset="0"/>
+              </a:rPr>
+              <a:t> Technischer Entwurf</a:t>
             </a:r>
             <a:endParaRPr lang="de-DE" sz="3600" dirty="0">
               <a:solidFill>
@@ -19828,9 +20881,9 @@
           <p:nvPr/>
         </p:nvCxnSpPr>
         <p:spPr>
-          <a:xfrm>
-            <a:off x="3785111" y="3937000"/>
-            <a:ext cx="4621778" cy="0"/>
+          <a:xfrm flipV="1">
+            <a:off x="1047624" y="3904814"/>
+            <a:ext cx="10219023" cy="32186"/>
           </a:xfrm>
           <a:prstGeom prst="line">
             <a:avLst/>
@@ -20122,10 +21175,10 @@
       </p:sp>
       <p:pic>
         <p:nvPicPr>
-          <p:cNvPr id="2050" name="Picture 2">
+          <p:cNvPr id="2" name="Picture 2">
             <a:extLst>
               <a:ext uri="{FF2B5EF4-FFF2-40B4-BE49-F238E27FC236}">
-                <a16:creationId xmlns:a16="http://schemas.microsoft.com/office/drawing/2014/main" id="{2FA6166B-6BB7-3A3C-3832-847864B67638}"/>
+                <a16:creationId xmlns:a16="http://schemas.microsoft.com/office/drawing/2014/main" id="{D4E54DF6-2C92-AF1F-D8BF-4B5F3A712F8C}"/>
               </a:ext>
             </a:extLst>
           </p:cNvPr>
@@ -20159,8 +21212,8 @@
         </p:blipFill>
         <p:spPr bwMode="auto">
           <a:xfrm>
-            <a:off x="2665486" y="1385225"/>
-            <a:ext cx="6714684" cy="4796203"/>
+            <a:off x="2416859" y="1287632"/>
+            <a:ext cx="6575750" cy="4833629"/>
           </a:xfrm>
           <a:prstGeom prst="rect">
             <a:avLst/>
@@ -20205,6 +21258,14 @@
 <file path=ppt/slides/slide8.xml><?xml version="1.0" encoding="utf-8"?>
 <p:sld xmlns:a="http://schemas.openxmlformats.org/drawingml/2006/main" xmlns:r="http://schemas.openxmlformats.org/officeDocument/2006/relationships" xmlns:p="http://schemas.openxmlformats.org/presentationml/2006/main">
   <p:cSld>
+    <p:bg>
+      <p:bgPr>
+        <a:solidFill>
+          <a:srgbClr val="F8F8F8"/>
+        </a:solidFill>
+        <a:effectLst/>
+      </p:bgPr>
+    </p:bg>
     <p:spTree>
       <p:nvGrpSpPr>
         <p:cNvPr id="1" name=""/>
@@ -20219,77 +21280,12 @@
           <a:chExt cx="0" cy="0"/>
         </a:xfrm>
       </p:grpSpPr>
-      <p:sp>
-        <p:nvSpPr>
-          <p:cNvPr id="6" name="Textfeld 5">
+      <p:pic>
+        <p:nvPicPr>
+          <p:cNvPr id="13" name="Grafik 12" descr="Ein Bild, das Schrift, Screenshot, Grafiken, Text enthält.&#10;&#10;Automatisch generierte Beschreibung">
             <a:extLst>
               <a:ext uri="{FF2B5EF4-FFF2-40B4-BE49-F238E27FC236}">
-                <a16:creationId xmlns:a16="http://schemas.microsoft.com/office/drawing/2014/main" id="{24190192-88EA-6350-4B85-DA0D3327D232}"/>
-              </a:ext>
-            </a:extLst>
-          </p:cNvPr>
-          <p:cNvSpPr txBox="1"/>
-          <p:nvPr/>
-        </p:nvSpPr>
-        <p:spPr>
-          <a:xfrm>
-            <a:off x="1462360" y="2438941"/>
-            <a:ext cx="9267281" cy="769441"/>
-          </a:xfrm>
-          <a:prstGeom prst="rect">
-            <a:avLst/>
-          </a:prstGeom>
-          <a:noFill/>
-        </p:spPr>
-        <p:txBody>
-          <a:bodyPr wrap="none" rtlCol="0">
-            <a:spAutoFit/>
-          </a:bodyPr>
-          <a:lstStyle/>
-          <a:p>
-            <a:pPr algn="ctr"/>
-            <a:r>
-              <a:rPr lang="de-DE" sz="4400" b="1" dirty="0">
-                <a:solidFill>
-                  <a:schemeClr val="accent1">
-                    <a:lumMod val="40000"/>
-                    <a:lumOff val="60000"/>
-                  </a:schemeClr>
-                </a:solidFill>
-                <a:latin typeface="Montserrat" panose="02000505000000020004" pitchFamily="2" charset="0"/>
-              </a:rPr>
-              <a:t>&lt;</a:t>
-            </a:r>
-            <a:r>
-              <a:rPr lang="de-DE" sz="4400" b="1" dirty="0">
-                <a:solidFill>
-                  <a:srgbClr val="2667FF"/>
-                </a:solidFill>
-                <a:latin typeface="Montserrat" panose="02000505000000020004" pitchFamily="2" charset="0"/>
-              </a:rPr>
-              <a:t>Verwaltung einer Helferliste</a:t>
-            </a:r>
-            <a:r>
-              <a:rPr lang="de-DE" sz="4400" b="1" dirty="0">
-                <a:solidFill>
-                  <a:schemeClr val="accent1">
-                    <a:lumMod val="40000"/>
-                    <a:lumOff val="60000"/>
-                  </a:schemeClr>
-                </a:solidFill>
-                <a:latin typeface="Montserrat" panose="02000505000000020004" pitchFamily="2" charset="0"/>
-              </a:rPr>
-              <a:t>/&gt;</a:t>
-            </a:r>
-          </a:p>
-        </p:txBody>
-      </p:sp>
-      <p:pic>
-        <p:nvPicPr>
-          <p:cNvPr id="7" name="Grafik 6" descr="Ein Bild, das Schrift, Screenshot, Grafiken, Text enthält.&#10;&#10;Automatisch generierte Beschreibung">
-            <a:extLst>
-              <a:ext uri="{FF2B5EF4-FFF2-40B4-BE49-F238E27FC236}">
-                <a16:creationId xmlns:a16="http://schemas.microsoft.com/office/drawing/2014/main" id="{7E86BC61-F1D6-40D1-FFA5-6A28D6CB1060}"/>
+                <a16:creationId xmlns:a16="http://schemas.microsoft.com/office/drawing/2014/main" id="{CEFD0BAA-CD64-1295-D48F-2145AC9083DE}"/>
               </a:ext>
             </a:extLst>
           </p:cNvPr>
@@ -20299,7 +21295,7 @@
           <p:nvPr/>
         </p:nvPicPr>
         <p:blipFill>
-          <a:blip r:embed="rId2">
+          <a:blip r:embed="rId3">
             <a:extLst>
               <a:ext uri="{28A0092B-C50C-407E-A947-70E740481C1C}">
                 <a14:useLocalDpi xmlns:a14="http://schemas.microsoft.com/office/drawing/2010/main" val="0"/>
@@ -20322,10 +21318,10 @@
       </p:pic>
       <p:sp>
         <p:nvSpPr>
-          <p:cNvPr id="12" name="Textfeld 11">
+          <p:cNvPr id="2" name="Textfeld 1">
             <a:extLst>
               <a:ext uri="{FF2B5EF4-FFF2-40B4-BE49-F238E27FC236}">
-                <a16:creationId xmlns:a16="http://schemas.microsoft.com/office/drawing/2014/main" id="{6D5F4AAA-3D53-6AD2-9AA5-388D288752F7}"/>
+                <a16:creationId xmlns:a16="http://schemas.microsoft.com/office/drawing/2014/main" id="{B1C4A887-EA94-0AB4-2651-9A81FFB43401}"/>
               </a:ext>
             </a:extLst>
           </p:cNvPr>
@@ -20334,8 +21330,8 @@
         </p:nvSpPr>
         <p:spPr>
           <a:xfrm>
-            <a:off x="3579927" y="3258483"/>
-            <a:ext cx="5032147" cy="646331"/>
+            <a:off x="571500" y="483256"/>
+            <a:ext cx="4496744" cy="584775"/>
           </a:xfrm>
           <a:prstGeom prst="rect">
             <a:avLst/>
@@ -20348,9 +21344,8 @@
           </a:bodyPr>
           <a:lstStyle/>
           <a:p>
-            <a:pPr algn="ctr"/>
             <a:r>
-              <a:rPr lang="de-DE" sz="3600" b="1" dirty="0">
+              <a:rPr lang="de-DE" sz="3200" b="1" dirty="0">
                 <a:solidFill>
                   <a:srgbClr val="050410"/>
                 </a:solidFill>
@@ -20358,342 +21353,146 @@
               </a:rPr>
               <a:t>Technischer Entwurf</a:t>
             </a:r>
-            <a:endParaRPr lang="de-DE" sz="3600" dirty="0">
+            <a:endParaRPr lang="de-DE" b="1" dirty="0">
               <a:solidFill>
-                <a:srgbClr val="2667FF"/>
+                <a:srgbClr val="050410"/>
               </a:solidFill>
-              <a:latin typeface="Montserrat ExtraBold" panose="00000900000000000000" pitchFamily="2" charset="0"/>
+              <a:latin typeface="Montserrat" panose="02000505000000020004" pitchFamily="2" charset="0"/>
             </a:endParaRPr>
           </a:p>
         </p:txBody>
       </p:sp>
-      <p:grpSp>
-        <p:nvGrpSpPr>
-          <p:cNvPr id="21" name="Gruppieren 20">
+      <p:sp>
+        <p:nvSpPr>
+          <p:cNvPr id="3" name="Ellipse 2">
             <a:extLst>
               <a:ext uri="{FF2B5EF4-FFF2-40B4-BE49-F238E27FC236}">
-                <a16:creationId xmlns:a16="http://schemas.microsoft.com/office/drawing/2014/main" id="{10908CA2-1805-30C1-C55D-CC437ED4C972}"/>
+                <a16:creationId xmlns:a16="http://schemas.microsoft.com/office/drawing/2014/main" id="{571C40CA-3129-1673-F271-B68099B4F19F}"/>
               </a:ext>
             </a:extLst>
           </p:cNvPr>
-          <p:cNvGrpSpPr/>
+          <p:cNvSpPr/>
           <p:nvPr/>
-        </p:nvGrpSpPr>
-        <p:grpSpPr>
-          <a:xfrm>
-            <a:off x="9823546" y="-990601"/>
-            <a:ext cx="3440782" cy="3007178"/>
-            <a:chOff x="148238" y="4701539"/>
-            <a:chExt cx="3440782" cy="3007178"/>
-          </a:xfrm>
-          <a:solidFill>
-            <a:srgbClr val="3B28CC">
-              <a:alpha val="30000"/>
-            </a:srgbClr>
-          </a:solidFill>
-        </p:grpSpPr>
-        <p:sp>
-          <p:nvSpPr>
-            <p:cNvPr id="22" name="Rechteck: abgerundete Ecken 21">
-              <a:extLst>
-                <a:ext uri="{FF2B5EF4-FFF2-40B4-BE49-F238E27FC236}">
-                  <a16:creationId xmlns:a16="http://schemas.microsoft.com/office/drawing/2014/main" id="{739503BD-5793-7781-95F7-9DCC9CECE586}"/>
-                </a:ext>
-              </a:extLst>
-            </p:cNvPr>
-            <p:cNvSpPr/>
-            <p:nvPr/>
-          </p:nvSpPr>
-          <p:spPr>
-            <a:xfrm>
-              <a:off x="929640" y="4701539"/>
-              <a:ext cx="2659380" cy="2480679"/>
-            </a:xfrm>
-            <a:prstGeom prst="roundRect">
-              <a:avLst>
-                <a:gd name="adj" fmla="val 24609"/>
-              </a:avLst>
-            </a:prstGeom>
-            <a:grpFill/>
-            <a:ln>
-              <a:noFill/>
-            </a:ln>
-          </p:spPr>
-          <p:style>
-            <a:lnRef idx="2">
-              <a:schemeClr val="accent1">
-                <a:shade val="50000"/>
-              </a:schemeClr>
-            </a:lnRef>
-            <a:fillRef idx="1">
-              <a:schemeClr val="accent1"/>
-            </a:fillRef>
-            <a:effectRef idx="0">
-              <a:schemeClr val="accent1"/>
-            </a:effectRef>
-            <a:fontRef idx="minor">
-              <a:schemeClr val="lt1"/>
-            </a:fontRef>
-          </p:style>
-          <p:txBody>
-            <a:bodyPr rtlCol="0" anchor="ctr"/>
-            <a:lstStyle/>
-            <a:p>
-              <a:pPr algn="ctr"/>
-              <a:endParaRPr lang="de-DE" dirty="0"/>
-            </a:p>
-          </p:txBody>
-        </p:sp>
-        <p:sp>
-          <p:nvSpPr>
-            <p:cNvPr id="23" name="Rechteck: abgerundete Ecken 22">
-              <a:extLst>
-                <a:ext uri="{FF2B5EF4-FFF2-40B4-BE49-F238E27FC236}">
-                  <a16:creationId xmlns:a16="http://schemas.microsoft.com/office/drawing/2014/main" id="{CBB5670A-C089-E95C-49F4-DC593C3E2146}"/>
-                </a:ext>
-              </a:extLst>
-            </p:cNvPr>
-            <p:cNvSpPr/>
-            <p:nvPr/>
-          </p:nvSpPr>
-          <p:spPr>
-            <a:xfrm>
-              <a:off x="148238" y="4928642"/>
-              <a:ext cx="1680562" cy="1665218"/>
-            </a:xfrm>
-            <a:prstGeom prst="roundRect">
-              <a:avLst>
-                <a:gd name="adj" fmla="val 24609"/>
-              </a:avLst>
-            </a:prstGeom>
-            <a:grpFill/>
-            <a:ln>
-              <a:noFill/>
-            </a:ln>
-          </p:spPr>
-          <p:style>
-            <a:lnRef idx="2">
-              <a:schemeClr val="accent1">
-                <a:shade val="50000"/>
-              </a:schemeClr>
-            </a:lnRef>
-            <a:fillRef idx="1">
-              <a:schemeClr val="accent1"/>
-            </a:fillRef>
-            <a:effectRef idx="0">
-              <a:schemeClr val="accent1"/>
-            </a:effectRef>
-            <a:fontRef idx="minor">
-              <a:schemeClr val="lt1"/>
-            </a:fontRef>
-          </p:style>
-          <p:txBody>
-            <a:bodyPr rtlCol="0" anchor="ctr"/>
-            <a:lstStyle/>
-            <a:p>
-              <a:pPr algn="ctr"/>
-              <a:endParaRPr lang="de-DE" dirty="0"/>
-            </a:p>
-          </p:txBody>
-        </p:sp>
-        <p:sp>
-          <p:nvSpPr>
-            <p:cNvPr id="24" name="Rechteck: abgerundete Ecken 23">
-              <a:extLst>
-                <a:ext uri="{FF2B5EF4-FFF2-40B4-BE49-F238E27FC236}">
-                  <a16:creationId xmlns:a16="http://schemas.microsoft.com/office/drawing/2014/main" id="{91E30FD3-4514-D97D-14D3-EEEB3F01D223}"/>
-                </a:ext>
-              </a:extLst>
-            </p:cNvPr>
-            <p:cNvSpPr/>
-            <p:nvPr/>
-          </p:nvSpPr>
-          <p:spPr>
-            <a:xfrm>
-              <a:off x="1461909" y="6043499"/>
-              <a:ext cx="1680562" cy="1665218"/>
-            </a:xfrm>
-            <a:prstGeom prst="roundRect">
-              <a:avLst>
-                <a:gd name="adj" fmla="val 24609"/>
-              </a:avLst>
-            </a:prstGeom>
-            <a:grpFill/>
-            <a:ln>
-              <a:noFill/>
-            </a:ln>
-          </p:spPr>
-          <p:style>
-            <a:lnRef idx="2">
-              <a:schemeClr val="accent1">
-                <a:shade val="50000"/>
-              </a:schemeClr>
-            </a:lnRef>
-            <a:fillRef idx="1">
-              <a:schemeClr val="accent1"/>
-            </a:fillRef>
-            <a:effectRef idx="0">
-              <a:schemeClr val="accent1"/>
-            </a:effectRef>
-            <a:fontRef idx="minor">
-              <a:schemeClr val="lt1"/>
-            </a:fontRef>
-          </p:style>
-          <p:txBody>
-            <a:bodyPr rtlCol="0" anchor="ctr"/>
-            <a:lstStyle/>
-            <a:p>
-              <a:pPr algn="ctr"/>
-              <a:endParaRPr lang="de-DE" dirty="0"/>
-            </a:p>
-          </p:txBody>
-        </p:sp>
-      </p:grpSp>
-      <p:cxnSp>
-        <p:nvCxnSpPr>
-          <p:cNvPr id="5" name="Gerader Verbinder 4">
-            <a:extLst>
-              <a:ext uri="{FF2B5EF4-FFF2-40B4-BE49-F238E27FC236}">
-                <a16:creationId xmlns:a16="http://schemas.microsoft.com/office/drawing/2014/main" id="{4E720588-AE3F-29A6-B48A-BF55BDBF7F11}"/>
-              </a:ext>
-            </a:extLst>
-          </p:cNvPr>
-          <p:cNvCxnSpPr>
-            <a:cxnSpLocks/>
-          </p:cNvCxnSpPr>
-          <p:nvPr/>
-        </p:nvCxnSpPr>
+        </p:nvSpPr>
         <p:spPr>
           <a:xfrm>
-            <a:off x="3663950" y="3937000"/>
-            <a:ext cx="4948124" cy="0"/>
+            <a:off x="453941" y="714667"/>
+            <a:ext cx="121953" cy="121953"/>
           </a:xfrm>
-          <a:prstGeom prst="line">
+          <a:prstGeom prst="ellipse">
             <a:avLst/>
           </a:prstGeom>
+          <a:noFill/>
           <a:ln w="57150">
             <a:solidFill>
-              <a:schemeClr val="tx1">
-                <a:lumMod val="85000"/>
-                <a:lumOff val="15000"/>
-              </a:schemeClr>
+              <a:srgbClr val="3B28CC"/>
             </a:solidFill>
           </a:ln>
         </p:spPr>
         <p:style>
-          <a:lnRef idx="1">
-            <a:schemeClr val="accent1"/>
+          <a:lnRef idx="2">
+            <a:schemeClr val="accent1">
+              <a:shade val="15000"/>
+            </a:schemeClr>
           </a:lnRef>
-          <a:fillRef idx="0">
+          <a:fillRef idx="1">
             <a:schemeClr val="accent1"/>
           </a:fillRef>
           <a:effectRef idx="0">
             <a:schemeClr val="accent1"/>
           </a:effectRef>
           <a:fontRef idx="minor">
-            <a:schemeClr val="tx1"/>
+            <a:schemeClr val="lt1"/>
           </a:fontRef>
         </p:style>
-      </p:cxnSp>
+        <p:txBody>
+          <a:bodyPr rtlCol="0" anchor="ctr"/>
+          <a:lstStyle/>
+          <a:p>
+            <a:pPr algn="ctr"/>
+            <a:endParaRPr lang="de-DE"/>
+          </a:p>
+        </p:txBody>
+      </p:sp>
+      <p:pic>
+        <p:nvPicPr>
+          <p:cNvPr id="2050" name="Picture 2">
+            <a:extLst>
+              <a:ext uri="{FF2B5EF4-FFF2-40B4-BE49-F238E27FC236}">
+                <a16:creationId xmlns:a16="http://schemas.microsoft.com/office/drawing/2014/main" id="{CCAF5AA4-654D-928C-BCFC-78BA29627333}"/>
+              </a:ext>
+            </a:extLst>
+          </p:cNvPr>
+          <p:cNvPicPr>
+            <a:picLocks noChangeAspect="1" noChangeArrowheads="1"/>
+          </p:cNvPicPr>
+          <p:nvPr/>
+        </p:nvPicPr>
+        <p:blipFill>
+          <a:blip r:embed="rId4">
+            <a:clrChange>
+              <a:clrFrom>
+                <a:srgbClr val="FFFFFF"/>
+              </a:clrFrom>
+              <a:clrTo>
+                <a:srgbClr val="FFFFFF">
+                  <a:alpha val="0"/>
+                </a:srgbClr>
+              </a:clrTo>
+            </a:clrChange>
+            <a:extLst>
+              <a:ext uri="{28A0092B-C50C-407E-A947-70E740481C1C}">
+                <a14:useLocalDpi xmlns:a14="http://schemas.microsoft.com/office/drawing/2010/main" val="0"/>
+              </a:ext>
+            </a:extLst>
+          </a:blip>
+          <a:srcRect/>
+          <a:stretch>
+            <a:fillRect/>
+          </a:stretch>
+        </p:blipFill>
+        <p:spPr bwMode="auto">
+          <a:xfrm>
+            <a:off x="928048" y="836620"/>
+            <a:ext cx="10508776" cy="5350171"/>
+          </a:xfrm>
+          <a:prstGeom prst="rect">
+            <a:avLst/>
+          </a:prstGeom>
+          <a:noFill/>
+          <a:extLst>
+            <a:ext uri="{909E8E84-426E-40DD-AFC4-6F175D3DCCD1}">
+              <a14:hiddenFill xmlns:a14="http://schemas.microsoft.com/office/drawing/2010/main">
+                <a:solidFill>
+                  <a:srgbClr val="FFFFFF"/>
+                </a:solidFill>
+              </a14:hiddenFill>
+            </a:ext>
+          </a:extLst>
+        </p:spPr>
+      </p:pic>
     </p:spTree>
     <p:extLst>
       <p:ext uri="{BB962C8B-B14F-4D97-AF65-F5344CB8AC3E}">
-        <p14:creationId xmlns:p14="http://schemas.microsoft.com/office/powerpoint/2010/main" val="3142529432"/>
+        <p14:creationId xmlns:p14="http://schemas.microsoft.com/office/powerpoint/2010/main" val="686082316"/>
       </p:ext>
     </p:extLst>
   </p:cSld>
   <p:clrMapOvr>
     <a:masterClrMapping/>
   </p:clrMapOvr>
-  <p:transition spd="med">
-    <p:push/>
-  </p:transition>
-  <p:timing>
-    <p:tnLst>
-      <p:par>
-        <p:cTn id="1" dur="indefinite" restart="never" nodeType="tmRoot">
-          <p:childTnLst>
-            <p:seq concurrent="1" nextAc="seek">
-              <p:cTn id="2" dur="indefinite" nodeType="mainSeq">
-                <p:childTnLst>
-                  <p:par>
-                    <p:cTn id="3" fill="hold">
-                      <p:stCondLst>
-                        <p:cond delay="indefinite"/>
-                        <p:cond evt="onBegin" delay="0">
-                          <p:tn val="2"/>
-                        </p:cond>
-                      </p:stCondLst>
-                      <p:childTnLst>
-                        <p:par>
-                          <p:cTn id="4" fill="hold">
-                            <p:stCondLst>
-                              <p:cond delay="0"/>
-                            </p:stCondLst>
-                            <p:childTnLst>
-                              <p:par>
-                                <p:cTn id="5" presetID="22" presetClass="entr" presetSubtype="8" fill="hold" nodeType="afterEffect">
-                                  <p:stCondLst>
-                                    <p:cond delay="0"/>
-                                  </p:stCondLst>
-                                  <p:childTnLst>
-                                    <p:set>
-                                      <p:cBhvr>
-                                        <p:cTn id="6" dur="1" fill="hold">
-                                          <p:stCondLst>
-                                            <p:cond delay="0"/>
-                                          </p:stCondLst>
-                                        </p:cTn>
-                                        <p:tgtEl>
-                                          <p:spTgt spid="5"/>
-                                        </p:tgtEl>
-                                        <p:attrNameLst>
-                                          <p:attrName>style.visibility</p:attrName>
-                                        </p:attrNameLst>
-                                      </p:cBhvr>
-                                      <p:to>
-                                        <p:strVal val="visible"/>
-                                      </p:to>
-                                    </p:set>
-                                    <p:animEffect transition="in" filter="wipe(left)">
-                                      <p:cBhvr>
-                                        <p:cTn id="7" dur="500"/>
-                                        <p:tgtEl>
-                                          <p:spTgt spid="5"/>
-                                        </p:tgtEl>
-                                      </p:cBhvr>
-                                    </p:animEffect>
-                                  </p:childTnLst>
-                                </p:cTn>
-                              </p:par>
-                            </p:childTnLst>
-                          </p:cTn>
-                        </p:par>
-                      </p:childTnLst>
-                    </p:cTn>
-                  </p:par>
-                </p:childTnLst>
-              </p:cTn>
-              <p:prevCondLst>
-                <p:cond evt="onPrev" delay="0">
-                  <p:tgtEl>
-                    <p:sldTgt/>
-                  </p:tgtEl>
-                </p:cond>
-              </p:prevCondLst>
-              <p:nextCondLst>
-                <p:cond evt="onNext" delay="0">
-                  <p:tgtEl>
-                    <p:sldTgt/>
-                  </p:tgtEl>
-                </p:cond>
-              </p:nextCondLst>
-            </p:seq>
-          </p:childTnLst>
-        </p:cTn>
-      </p:par>
-    </p:tnLst>
-  </p:timing>
+  <mc:AlternateContent xmlns:mc="http://schemas.openxmlformats.org/markup-compatibility/2006" xmlns:p159="http://schemas.microsoft.com/office/powerpoint/2015/09/main">
+    <mc:Choice Requires="p159">
+      <p:transition xmlns:p14="http://schemas.microsoft.com/office/powerpoint/2010/main" spd="slow" p14:dur="2000">
+        <p159:morph option="byObject"/>
+      </p:transition>
+    </mc:Choice>
+    <mc:Fallback xmlns="">
+      <p:transition spd="slow">
+        <p:fade/>
+      </p:transition>
+    </mc:Fallback>
+  </mc:AlternateContent>
 </p:sld>
 </file>
 
@@ -20760,10 +21559,10 @@
       </p:pic>
       <p:pic>
         <p:nvPicPr>
-          <p:cNvPr id="3074" name="Picture 2">
+          <p:cNvPr id="2050" name="Picture 2">
             <a:extLst>
               <a:ext uri="{FF2B5EF4-FFF2-40B4-BE49-F238E27FC236}">
-                <a16:creationId xmlns:a16="http://schemas.microsoft.com/office/drawing/2014/main" id="{5D59FB81-0402-356A-9FF2-C939A5AA180B}"/>
+                <a16:creationId xmlns:a16="http://schemas.microsoft.com/office/drawing/2014/main" id="{35942184-B983-C13D-D65F-545CE303D5F5}"/>
               </a:ext>
             </a:extLst>
           </p:cNvPr>
@@ -20772,23 +21571,31 @@
           </p:cNvPicPr>
           <p:nvPr/>
         </p:nvPicPr>
-        <p:blipFill>
+        <p:blipFill rotWithShape="1">
           <a:blip r:embed="rId4">
+            <a:clrChange>
+              <a:clrFrom>
+                <a:srgbClr val="FFFFFF"/>
+              </a:clrFrom>
+              <a:clrTo>
+                <a:srgbClr val="FFFFFF">
+                  <a:alpha val="0"/>
+                </a:srgbClr>
+              </a:clrTo>
+            </a:clrChange>
             <a:extLst>
               <a:ext uri="{28A0092B-C50C-407E-A947-70E740481C1C}">
                 <a14:useLocalDpi xmlns:a14="http://schemas.microsoft.com/office/drawing/2010/main" val="0"/>
               </a:ext>
             </a:extLst>
           </a:blip>
-          <a:srcRect/>
-          <a:stretch>
-            <a:fillRect/>
-          </a:stretch>
+          <a:srcRect t="29191" r="77773" b="12379"/>
+          <a:stretch/>
         </p:blipFill>
         <p:spPr bwMode="auto">
           <a:xfrm>
-            <a:off x="1089660" y="648904"/>
-            <a:ext cx="10208525" cy="5560191"/>
+            <a:off x="7037861" y="1156123"/>
+            <a:ext cx="2863589" cy="4097136"/>
           </a:xfrm>
           <a:prstGeom prst="rect">
             <a:avLst/>
@@ -20805,10 +21612,425 @@
           </a:extLst>
         </p:spPr>
       </p:pic>
+      <p:sp>
+        <p:nvSpPr>
+          <p:cNvPr id="2" name="Textfeld 1">
+            <a:extLst>
+              <a:ext uri="{FF2B5EF4-FFF2-40B4-BE49-F238E27FC236}">
+                <a16:creationId xmlns:a16="http://schemas.microsoft.com/office/drawing/2014/main" id="{B1C4A887-EA94-0AB4-2651-9A81FFB43401}"/>
+              </a:ext>
+            </a:extLst>
+          </p:cNvPr>
+          <p:cNvSpPr txBox="1"/>
+          <p:nvPr/>
+        </p:nvSpPr>
+        <p:spPr>
+          <a:xfrm>
+            <a:off x="571500" y="483256"/>
+            <a:ext cx="3550972" cy="584775"/>
+          </a:xfrm>
+          <a:prstGeom prst="rect">
+            <a:avLst/>
+          </a:prstGeom>
+          <a:noFill/>
+        </p:spPr>
+        <p:txBody>
+          <a:bodyPr wrap="none" rtlCol="0">
+            <a:spAutoFit/>
+          </a:bodyPr>
+          <a:lstStyle/>
+          <a:p>
+            <a:r>
+              <a:rPr lang="de-DE" sz="3200" b="1" dirty="0">
+                <a:solidFill>
+                  <a:srgbClr val="050410"/>
+                </a:solidFill>
+                <a:latin typeface="Montserrat" panose="02000505000000020004" pitchFamily="2" charset="0"/>
+              </a:rPr>
+              <a:t>Zusammenhang</a:t>
+            </a:r>
+            <a:endParaRPr lang="de-DE" b="1" dirty="0">
+              <a:solidFill>
+                <a:srgbClr val="050410"/>
+              </a:solidFill>
+              <a:latin typeface="Montserrat" panose="02000505000000020004" pitchFamily="2" charset="0"/>
+            </a:endParaRPr>
+          </a:p>
+        </p:txBody>
+      </p:sp>
+      <p:sp>
+        <p:nvSpPr>
+          <p:cNvPr id="3" name="Ellipse 2">
+            <a:extLst>
+              <a:ext uri="{FF2B5EF4-FFF2-40B4-BE49-F238E27FC236}">
+                <a16:creationId xmlns:a16="http://schemas.microsoft.com/office/drawing/2014/main" id="{571C40CA-3129-1673-F271-B68099B4F19F}"/>
+              </a:ext>
+            </a:extLst>
+          </p:cNvPr>
+          <p:cNvSpPr/>
+          <p:nvPr/>
+        </p:nvSpPr>
+        <p:spPr>
+          <a:xfrm>
+            <a:off x="453941" y="714667"/>
+            <a:ext cx="121953" cy="121953"/>
+          </a:xfrm>
+          <a:prstGeom prst="ellipse">
+            <a:avLst/>
+          </a:prstGeom>
+          <a:noFill/>
+          <a:ln w="57150">
+            <a:solidFill>
+              <a:srgbClr val="3B28CC"/>
+            </a:solidFill>
+          </a:ln>
+        </p:spPr>
+        <p:style>
+          <a:lnRef idx="2">
+            <a:schemeClr val="accent1">
+              <a:shade val="15000"/>
+            </a:schemeClr>
+          </a:lnRef>
+          <a:fillRef idx="1">
+            <a:schemeClr val="accent1"/>
+          </a:fillRef>
+          <a:effectRef idx="0">
+            <a:schemeClr val="accent1"/>
+          </a:effectRef>
+          <a:fontRef idx="minor">
+            <a:schemeClr val="lt1"/>
+          </a:fontRef>
+        </p:style>
+        <p:txBody>
+          <a:bodyPr rtlCol="0" anchor="ctr"/>
+          <a:lstStyle/>
+          <a:p>
+            <a:pPr algn="ctr"/>
+            <a:endParaRPr lang="de-DE"/>
+          </a:p>
+        </p:txBody>
+      </p:sp>
+      <p:pic>
+        <p:nvPicPr>
+          <p:cNvPr id="5" name="Picture 2">
+            <a:extLst>
+              <a:ext uri="{FF2B5EF4-FFF2-40B4-BE49-F238E27FC236}">
+                <a16:creationId xmlns:a16="http://schemas.microsoft.com/office/drawing/2014/main" id="{68A9ADC3-E390-8928-C143-B8CDCE43E37D}"/>
+              </a:ext>
+            </a:extLst>
+          </p:cNvPr>
+          <p:cNvPicPr>
+            <a:picLocks noChangeAspect="1" noChangeArrowheads="1"/>
+          </p:cNvPicPr>
+          <p:nvPr/>
+        </p:nvPicPr>
+        <p:blipFill>
+          <a:blip r:embed="rId5">
+            <a:clrChange>
+              <a:clrFrom>
+                <a:srgbClr val="FFFFFF"/>
+              </a:clrFrom>
+              <a:clrTo>
+                <a:srgbClr val="FFFFFF">
+                  <a:alpha val="0"/>
+                </a:srgbClr>
+              </a:clrTo>
+            </a:clrChange>
+            <a:extLst>
+              <a:ext uri="{28A0092B-C50C-407E-A947-70E740481C1C}">
+                <a14:useLocalDpi xmlns:a14="http://schemas.microsoft.com/office/drawing/2010/main" val="0"/>
+              </a:ext>
+            </a:extLst>
+          </a:blip>
+          <a:srcRect/>
+          <a:stretch>
+            <a:fillRect/>
+          </a:stretch>
+        </p:blipFill>
+        <p:spPr bwMode="auto">
+          <a:xfrm>
+            <a:off x="1288009" y="1467133"/>
+            <a:ext cx="4926414" cy="4430539"/>
+          </a:xfrm>
+          <a:prstGeom prst="rect">
+            <a:avLst/>
+          </a:prstGeom>
+          <a:noFill/>
+          <a:extLst>
+            <a:ext uri="{909E8E84-426E-40DD-AFC4-6F175D3DCCD1}">
+              <a14:hiddenFill xmlns:a14="http://schemas.microsoft.com/office/drawing/2010/main">
+                <a:solidFill>
+                  <a:srgbClr val="FFFFFF"/>
+                </a:solidFill>
+              </a14:hiddenFill>
+            </a:ext>
+          </a:extLst>
+        </p:spPr>
+      </p:pic>
+      <p:cxnSp>
+        <p:nvCxnSpPr>
+          <p:cNvPr id="7" name="Gerader Verbinder 6">
+            <a:extLst>
+              <a:ext uri="{FF2B5EF4-FFF2-40B4-BE49-F238E27FC236}">
+                <a16:creationId xmlns:a16="http://schemas.microsoft.com/office/drawing/2014/main" id="{FBB5976C-08C5-3A17-500C-BD4B039D802D}"/>
+              </a:ext>
+            </a:extLst>
+          </p:cNvPr>
+          <p:cNvCxnSpPr/>
+          <p:nvPr/>
+        </p:nvCxnSpPr>
+        <p:spPr>
+          <a:xfrm>
+            <a:off x="3627322" y="2052858"/>
+            <a:ext cx="3469875" cy="2301139"/>
+          </a:xfrm>
+          <a:prstGeom prst="line">
+            <a:avLst/>
+          </a:prstGeom>
+          <a:ln w="28575">
+            <a:solidFill>
+              <a:srgbClr val="3B28CC"/>
+            </a:solidFill>
+          </a:ln>
+        </p:spPr>
+        <p:style>
+          <a:lnRef idx="1">
+            <a:schemeClr val="accent1"/>
+          </a:lnRef>
+          <a:fillRef idx="0">
+            <a:schemeClr val="accent1"/>
+          </a:fillRef>
+          <a:effectRef idx="0">
+            <a:schemeClr val="accent1"/>
+          </a:effectRef>
+          <a:fontRef idx="minor">
+            <a:schemeClr val="tx1"/>
+          </a:fontRef>
+        </p:style>
+      </p:cxnSp>
+      <p:cxnSp>
+        <p:nvCxnSpPr>
+          <p:cNvPr id="8" name="Gerader Verbinder 7">
+            <a:extLst>
+              <a:ext uri="{FF2B5EF4-FFF2-40B4-BE49-F238E27FC236}">
+                <a16:creationId xmlns:a16="http://schemas.microsoft.com/office/drawing/2014/main" id="{034DF095-DEFA-5F5F-266B-4DC802D2E24D}"/>
+              </a:ext>
+            </a:extLst>
+          </p:cNvPr>
+          <p:cNvCxnSpPr>
+            <a:cxnSpLocks/>
+          </p:cNvCxnSpPr>
+          <p:nvPr/>
+        </p:nvCxnSpPr>
+        <p:spPr>
+          <a:xfrm flipV="1">
+            <a:off x="5970850" y="2500975"/>
+            <a:ext cx="1459407" cy="387560"/>
+          </a:xfrm>
+          <a:prstGeom prst="line">
+            <a:avLst/>
+          </a:prstGeom>
+          <a:ln w="28575">
+            <a:solidFill>
+              <a:srgbClr val="3B28CC"/>
+            </a:solidFill>
+          </a:ln>
+        </p:spPr>
+        <p:style>
+          <a:lnRef idx="1">
+            <a:schemeClr val="accent1"/>
+          </a:lnRef>
+          <a:fillRef idx="0">
+            <a:schemeClr val="accent1"/>
+          </a:fillRef>
+          <a:effectRef idx="0">
+            <a:schemeClr val="accent1"/>
+          </a:effectRef>
+          <a:fontRef idx="minor">
+            <a:schemeClr val="tx1"/>
+          </a:fontRef>
+        </p:style>
+      </p:cxnSp>
+      <p:cxnSp>
+        <p:nvCxnSpPr>
+          <p:cNvPr id="11" name="Gerader Verbinder 10">
+            <a:extLst>
+              <a:ext uri="{FF2B5EF4-FFF2-40B4-BE49-F238E27FC236}">
+                <a16:creationId xmlns:a16="http://schemas.microsoft.com/office/drawing/2014/main" id="{73F4280E-3693-8314-6185-19C2C3B9C014}"/>
+              </a:ext>
+            </a:extLst>
+          </p:cNvPr>
+          <p:cNvCxnSpPr>
+            <a:cxnSpLocks/>
+          </p:cNvCxnSpPr>
+          <p:nvPr/>
+        </p:nvCxnSpPr>
+        <p:spPr>
+          <a:xfrm flipV="1">
+            <a:off x="3421430" y="1604742"/>
+            <a:ext cx="4008827" cy="1211126"/>
+          </a:xfrm>
+          <a:prstGeom prst="line">
+            <a:avLst/>
+          </a:prstGeom>
+          <a:ln w="28575">
+            <a:solidFill>
+              <a:srgbClr val="3F8EFC"/>
+            </a:solidFill>
+          </a:ln>
+        </p:spPr>
+        <p:style>
+          <a:lnRef idx="1">
+            <a:schemeClr val="accent1"/>
+          </a:lnRef>
+          <a:fillRef idx="0">
+            <a:schemeClr val="accent1"/>
+          </a:fillRef>
+          <a:effectRef idx="0">
+            <a:schemeClr val="accent1"/>
+          </a:effectRef>
+          <a:fontRef idx="minor">
+            <a:schemeClr val="tx1"/>
+          </a:fontRef>
+        </p:style>
+      </p:cxnSp>
+      <p:cxnSp>
+        <p:nvCxnSpPr>
+          <p:cNvPr id="15" name="Gerader Verbinder 14">
+            <a:extLst>
+              <a:ext uri="{FF2B5EF4-FFF2-40B4-BE49-F238E27FC236}">
+                <a16:creationId xmlns:a16="http://schemas.microsoft.com/office/drawing/2014/main" id="{0F1B94B5-239E-9A05-FF3C-BDD37529FC6E}"/>
+              </a:ext>
+            </a:extLst>
+          </p:cNvPr>
+          <p:cNvCxnSpPr>
+            <a:cxnSpLocks/>
+          </p:cNvCxnSpPr>
+          <p:nvPr/>
+        </p:nvCxnSpPr>
+        <p:spPr>
+          <a:xfrm flipV="1">
+            <a:off x="3542543" y="3488042"/>
+            <a:ext cx="3887714" cy="554091"/>
+          </a:xfrm>
+          <a:prstGeom prst="line">
+            <a:avLst/>
+          </a:prstGeom>
+          <a:ln w="28575">
+            <a:solidFill>
+              <a:srgbClr val="3F8EFC"/>
+            </a:solidFill>
+          </a:ln>
+        </p:spPr>
+        <p:style>
+          <a:lnRef idx="1">
+            <a:schemeClr val="accent1"/>
+          </a:lnRef>
+          <a:fillRef idx="0">
+            <a:schemeClr val="accent1"/>
+          </a:fillRef>
+          <a:effectRef idx="0">
+            <a:schemeClr val="accent1"/>
+          </a:effectRef>
+          <a:fontRef idx="minor">
+            <a:schemeClr val="tx1"/>
+          </a:fontRef>
+        </p:style>
+      </p:cxnSp>
+      <p:sp>
+        <p:nvSpPr>
+          <p:cNvPr id="21" name="Textfeld 20">
+            <a:extLst>
+              <a:ext uri="{FF2B5EF4-FFF2-40B4-BE49-F238E27FC236}">
+                <a16:creationId xmlns:a16="http://schemas.microsoft.com/office/drawing/2014/main" id="{301D1A7C-D7B1-AA53-F67B-33AD12A48282}"/>
+              </a:ext>
+            </a:extLst>
+          </p:cNvPr>
+          <p:cNvSpPr txBox="1"/>
+          <p:nvPr/>
+        </p:nvSpPr>
+        <p:spPr>
+          <a:xfrm>
+            <a:off x="7857432" y="5409489"/>
+            <a:ext cx="995785" cy="584775"/>
+          </a:xfrm>
+          <a:prstGeom prst="rect">
+            <a:avLst/>
+          </a:prstGeom>
+          <a:noFill/>
+        </p:spPr>
+        <p:txBody>
+          <a:bodyPr wrap="none" rtlCol="0">
+            <a:spAutoFit/>
+          </a:bodyPr>
+          <a:lstStyle/>
+          <a:p>
+            <a:r>
+              <a:rPr lang="de-DE" sz="3200" b="1" dirty="0">
+                <a:solidFill>
+                  <a:srgbClr val="050410"/>
+                </a:solidFill>
+                <a:latin typeface="Montserrat" panose="02000505000000020004" pitchFamily="2" charset="0"/>
+              </a:rPr>
+              <a:t>JPA</a:t>
+            </a:r>
+            <a:endParaRPr lang="de-DE" b="1" dirty="0">
+              <a:solidFill>
+                <a:srgbClr val="050410"/>
+              </a:solidFill>
+              <a:latin typeface="Montserrat" panose="02000505000000020004" pitchFamily="2" charset="0"/>
+            </a:endParaRPr>
+          </a:p>
+        </p:txBody>
+      </p:sp>
+      <p:cxnSp>
+        <p:nvCxnSpPr>
+          <p:cNvPr id="22" name="Gerader Verbinder 21">
+            <a:extLst>
+              <a:ext uri="{FF2B5EF4-FFF2-40B4-BE49-F238E27FC236}">
+                <a16:creationId xmlns:a16="http://schemas.microsoft.com/office/drawing/2014/main" id="{97FAAFFA-3D84-1D3A-71EA-588CD62AF238}"/>
+              </a:ext>
+            </a:extLst>
+          </p:cNvPr>
+          <p:cNvCxnSpPr>
+            <a:cxnSpLocks/>
+            <a:endCxn id="21" idx="1"/>
+          </p:cNvCxnSpPr>
+          <p:nvPr/>
+        </p:nvCxnSpPr>
+        <p:spPr>
+          <a:xfrm>
+            <a:off x="3751216" y="5132146"/>
+            <a:ext cx="4106216" cy="569731"/>
+          </a:xfrm>
+          <a:prstGeom prst="line">
+            <a:avLst/>
+          </a:prstGeom>
+          <a:ln w="28575">
+            <a:solidFill>
+              <a:srgbClr val="E2C910"/>
+            </a:solidFill>
+          </a:ln>
+        </p:spPr>
+        <p:style>
+          <a:lnRef idx="1">
+            <a:schemeClr val="accent1"/>
+          </a:lnRef>
+          <a:fillRef idx="0">
+            <a:schemeClr val="accent1"/>
+          </a:fillRef>
+          <a:effectRef idx="0">
+            <a:schemeClr val="accent1"/>
+          </a:effectRef>
+          <a:fontRef idx="minor">
+            <a:schemeClr val="tx1"/>
+          </a:fontRef>
+        </p:style>
+      </p:cxnSp>
     </p:spTree>
     <p:extLst>
       <p:ext uri="{BB962C8B-B14F-4D97-AF65-F5344CB8AC3E}">
-        <p14:creationId xmlns:p14="http://schemas.microsoft.com/office/powerpoint/2010/main" val="686082316"/>
+        <p14:creationId xmlns:p14="http://schemas.microsoft.com/office/powerpoint/2010/main" val="256778910"/>
       </p:ext>
     </p:extLst>
   </p:cSld>

</xml_diff>

<commit_message>
finish presentation + uncomment helfer insert in SQL script
</commit_message>
<xml_diff>
--- a/End-Präsentation.pptx
+++ b/End-Präsentation.pptx
@@ -5,7 +5,7 @@
     <p:sldMasterId id="2147483648" r:id="rId1"/>
   </p:sldMasterIdLst>
   <p:notesMasterIdLst>
-    <p:notesMasterId r:id="rId15"/>
+    <p:notesMasterId r:id="rId18"/>
   </p:notesMasterIdLst>
   <p:sldIdLst>
     <p:sldId id="256" r:id="rId2"/>
@@ -20,7 +20,10 @@
     <p:sldId id="356" r:id="rId11"/>
     <p:sldId id="357" r:id="rId12"/>
     <p:sldId id="345" r:id="rId13"/>
-    <p:sldId id="268" r:id="rId14"/>
+    <p:sldId id="358" r:id="rId14"/>
+    <p:sldId id="359" r:id="rId15"/>
+    <p:sldId id="360" r:id="rId16"/>
+    <p:sldId id="268" r:id="rId17"/>
   </p:sldIdLst>
   <p:sldSz cx="12192000" cy="6858000"/>
   <p:notesSz cx="6858000" cy="9144000"/>
@@ -12780,6 +12783,267 @@
     <p:extLst>
       <p:ext uri="{BB962C8B-B14F-4D97-AF65-F5344CB8AC3E}">
         <p14:creationId xmlns:p14="http://schemas.microsoft.com/office/powerpoint/2010/main" val="3182785232"/>
+      </p:ext>
+    </p:extLst>
+  </p:cSld>
+  <p:clrMapOvr>
+    <a:masterClrMapping/>
+  </p:clrMapOvr>
+</p:notes>
+</file>
+
+<file path=ppt/notesSlides/notesSlide10.xml><?xml version="1.0" encoding="utf-8"?>
+<p:notes xmlns:a="http://schemas.openxmlformats.org/drawingml/2006/main" xmlns:r="http://schemas.openxmlformats.org/officeDocument/2006/relationships" xmlns:p="http://schemas.openxmlformats.org/presentationml/2006/main">
+  <p:cSld>
+    <p:spTree>
+      <p:nvGrpSpPr>
+        <p:cNvPr id="1" name=""/>
+        <p:cNvGrpSpPr/>
+        <p:nvPr/>
+      </p:nvGrpSpPr>
+      <p:grpSpPr>
+        <a:xfrm>
+          <a:off x="0" y="0"/>
+          <a:ext cx="0" cy="0"/>
+          <a:chOff x="0" y="0"/>
+          <a:chExt cx="0" cy="0"/>
+        </a:xfrm>
+      </p:grpSpPr>
+      <p:sp>
+        <p:nvSpPr>
+          <p:cNvPr id="2" name="Folienbildplatzhalter 1"/>
+          <p:cNvSpPr>
+            <a:spLocks noGrp="1" noRot="1" noChangeAspect="1"/>
+          </p:cNvSpPr>
+          <p:nvPr>
+            <p:ph type="sldImg"/>
+          </p:nvPr>
+        </p:nvSpPr>
+        <p:spPr/>
+      </p:sp>
+      <p:sp>
+        <p:nvSpPr>
+          <p:cNvPr id="3" name="Notizenplatzhalter 2"/>
+          <p:cNvSpPr>
+            <a:spLocks noGrp="1"/>
+          </p:cNvSpPr>
+          <p:nvPr>
+            <p:ph type="body" idx="1"/>
+          </p:nvPr>
+        </p:nvSpPr>
+        <p:spPr/>
+        <p:txBody>
+          <a:bodyPr/>
+          <a:lstStyle/>
+          <a:p>
+            <a:r>
+              <a:rPr lang="de-DE" dirty="0"/>
+              <a:t>Folie zu erklären was machen Walzen überhaupt? Was ist das?</a:t>
+            </a:r>
+          </a:p>
+        </p:txBody>
+      </p:sp>
+      <p:sp>
+        <p:nvSpPr>
+          <p:cNvPr id="4" name="Foliennummernplatzhalter 3"/>
+          <p:cNvSpPr>
+            <a:spLocks noGrp="1"/>
+          </p:cNvSpPr>
+          <p:nvPr>
+            <p:ph type="sldNum" sz="quarter" idx="5"/>
+          </p:nvPr>
+        </p:nvSpPr>
+        <p:spPr/>
+        <p:txBody>
+          <a:bodyPr/>
+          <a:lstStyle/>
+          <a:p>
+            <a:fld id="{7019B76D-A09E-4559-8E19-D159EA5CA74D}" type="slidenum">
+              <a:rPr lang="de-DE" smtClean="0"/>
+              <a:t>14</a:t>
+            </a:fld>
+            <a:endParaRPr lang="de-DE"/>
+          </a:p>
+        </p:txBody>
+      </p:sp>
+    </p:spTree>
+    <p:extLst>
+      <p:ext uri="{BB962C8B-B14F-4D97-AF65-F5344CB8AC3E}">
+        <p14:creationId xmlns:p14="http://schemas.microsoft.com/office/powerpoint/2010/main" val="1050355349"/>
+      </p:ext>
+    </p:extLst>
+  </p:cSld>
+  <p:clrMapOvr>
+    <a:masterClrMapping/>
+  </p:clrMapOvr>
+</p:notes>
+</file>
+
+<file path=ppt/notesSlides/notesSlide11.xml><?xml version="1.0" encoding="utf-8"?>
+<p:notes xmlns:a="http://schemas.openxmlformats.org/drawingml/2006/main" xmlns:r="http://schemas.openxmlformats.org/officeDocument/2006/relationships" xmlns:p="http://schemas.openxmlformats.org/presentationml/2006/main">
+  <p:cSld>
+    <p:spTree>
+      <p:nvGrpSpPr>
+        <p:cNvPr id="1" name=""/>
+        <p:cNvGrpSpPr/>
+        <p:nvPr/>
+      </p:nvGrpSpPr>
+      <p:grpSpPr>
+        <a:xfrm>
+          <a:off x="0" y="0"/>
+          <a:ext cx="0" cy="0"/>
+          <a:chOff x="0" y="0"/>
+          <a:chExt cx="0" cy="0"/>
+        </a:xfrm>
+      </p:grpSpPr>
+      <p:sp>
+        <p:nvSpPr>
+          <p:cNvPr id="2" name="Folienbildplatzhalter 1"/>
+          <p:cNvSpPr>
+            <a:spLocks noGrp="1" noRot="1" noChangeAspect="1"/>
+          </p:cNvSpPr>
+          <p:nvPr>
+            <p:ph type="sldImg"/>
+          </p:nvPr>
+        </p:nvSpPr>
+        <p:spPr/>
+      </p:sp>
+      <p:sp>
+        <p:nvSpPr>
+          <p:cNvPr id="3" name="Notizenplatzhalter 2"/>
+          <p:cNvSpPr>
+            <a:spLocks noGrp="1"/>
+          </p:cNvSpPr>
+          <p:nvPr>
+            <p:ph type="body" idx="1"/>
+          </p:nvPr>
+        </p:nvSpPr>
+        <p:spPr/>
+        <p:txBody>
+          <a:bodyPr/>
+          <a:lstStyle/>
+          <a:p>
+            <a:r>
+              <a:rPr lang="de-DE" dirty="0"/>
+              <a:t>Folie zu erklären was machen Walzen überhaupt? Was ist das?</a:t>
+            </a:r>
+          </a:p>
+        </p:txBody>
+      </p:sp>
+      <p:sp>
+        <p:nvSpPr>
+          <p:cNvPr id="4" name="Foliennummernplatzhalter 3"/>
+          <p:cNvSpPr>
+            <a:spLocks noGrp="1"/>
+          </p:cNvSpPr>
+          <p:nvPr>
+            <p:ph type="sldNum" sz="quarter" idx="5"/>
+          </p:nvPr>
+        </p:nvSpPr>
+        <p:spPr/>
+        <p:txBody>
+          <a:bodyPr/>
+          <a:lstStyle/>
+          <a:p>
+            <a:fld id="{7019B76D-A09E-4559-8E19-D159EA5CA74D}" type="slidenum">
+              <a:rPr lang="de-DE" smtClean="0"/>
+              <a:t>15</a:t>
+            </a:fld>
+            <a:endParaRPr lang="de-DE"/>
+          </a:p>
+        </p:txBody>
+      </p:sp>
+    </p:spTree>
+    <p:extLst>
+      <p:ext uri="{BB962C8B-B14F-4D97-AF65-F5344CB8AC3E}">
+        <p14:creationId xmlns:p14="http://schemas.microsoft.com/office/powerpoint/2010/main" val="404993620"/>
+      </p:ext>
+    </p:extLst>
+  </p:cSld>
+  <p:clrMapOvr>
+    <a:masterClrMapping/>
+  </p:clrMapOvr>
+</p:notes>
+</file>
+
+<file path=ppt/notesSlides/notesSlide12.xml><?xml version="1.0" encoding="utf-8"?>
+<p:notes xmlns:a="http://schemas.openxmlformats.org/drawingml/2006/main" xmlns:r="http://schemas.openxmlformats.org/officeDocument/2006/relationships" xmlns:p="http://schemas.openxmlformats.org/presentationml/2006/main">
+  <p:cSld>
+    <p:spTree>
+      <p:nvGrpSpPr>
+        <p:cNvPr id="1" name=""/>
+        <p:cNvGrpSpPr/>
+        <p:nvPr/>
+      </p:nvGrpSpPr>
+      <p:grpSpPr>
+        <a:xfrm>
+          <a:off x="0" y="0"/>
+          <a:ext cx="0" cy="0"/>
+          <a:chOff x="0" y="0"/>
+          <a:chExt cx="0" cy="0"/>
+        </a:xfrm>
+      </p:grpSpPr>
+      <p:sp>
+        <p:nvSpPr>
+          <p:cNvPr id="2" name="Folienbildplatzhalter 1"/>
+          <p:cNvSpPr>
+            <a:spLocks noGrp="1" noRot="1" noChangeAspect="1"/>
+          </p:cNvSpPr>
+          <p:nvPr>
+            <p:ph type="sldImg"/>
+          </p:nvPr>
+        </p:nvSpPr>
+        <p:spPr/>
+      </p:sp>
+      <p:sp>
+        <p:nvSpPr>
+          <p:cNvPr id="3" name="Notizenplatzhalter 2"/>
+          <p:cNvSpPr>
+            <a:spLocks noGrp="1"/>
+          </p:cNvSpPr>
+          <p:nvPr>
+            <p:ph type="body" idx="1"/>
+          </p:nvPr>
+        </p:nvSpPr>
+        <p:spPr/>
+        <p:txBody>
+          <a:bodyPr/>
+          <a:lstStyle/>
+          <a:p>
+            <a:r>
+              <a:rPr lang="de-DE" dirty="0"/>
+              <a:t>Folie zu erklären was machen Walzen überhaupt? Was ist das?</a:t>
+            </a:r>
+          </a:p>
+        </p:txBody>
+      </p:sp>
+      <p:sp>
+        <p:nvSpPr>
+          <p:cNvPr id="4" name="Foliennummernplatzhalter 3"/>
+          <p:cNvSpPr>
+            <a:spLocks noGrp="1"/>
+          </p:cNvSpPr>
+          <p:nvPr>
+            <p:ph type="sldNum" sz="quarter" idx="5"/>
+          </p:nvPr>
+        </p:nvSpPr>
+        <p:spPr/>
+        <p:txBody>
+          <a:bodyPr/>
+          <a:lstStyle/>
+          <a:p>
+            <a:fld id="{7019B76D-A09E-4559-8E19-D159EA5CA74D}" type="slidenum">
+              <a:rPr lang="de-DE" smtClean="0"/>
+              <a:t>16</a:t>
+            </a:fld>
+            <a:endParaRPr lang="de-DE"/>
+          </a:p>
+        </p:txBody>
+      </p:sp>
+    </p:spTree>
+    <p:extLst>
+      <p:ext uri="{BB962C8B-B14F-4D97-AF65-F5344CB8AC3E}">
+        <p14:creationId xmlns:p14="http://schemas.microsoft.com/office/powerpoint/2010/main" val="2477906949"/>
       </p:ext>
     </p:extLst>
   </p:cSld>
@@ -13475,7 +13739,7 @@
     </p:spTree>
     <p:extLst>
       <p:ext uri="{BB962C8B-B14F-4D97-AF65-F5344CB8AC3E}">
-        <p14:creationId xmlns:p14="http://schemas.microsoft.com/office/powerpoint/2010/main" val="2477906949"/>
+        <p14:creationId xmlns:p14="http://schemas.microsoft.com/office/powerpoint/2010/main" val="1992344104"/>
       </p:ext>
     </p:extLst>
   </p:cSld>
@@ -18233,6 +18497,474 @@
 </file>
 
 <file path=ppt/slides/slide13.xml><?xml version="1.0" encoding="utf-8"?>
+<p:sld xmlns:a="http://schemas.openxmlformats.org/drawingml/2006/main" xmlns:r="http://schemas.openxmlformats.org/officeDocument/2006/relationships" xmlns:p="http://schemas.openxmlformats.org/presentationml/2006/main">
+  <p:cSld>
+    <p:bg>
+      <p:bgPr>
+        <a:solidFill>
+          <a:srgbClr val="F8F8F8"/>
+        </a:solidFill>
+        <a:effectLst/>
+      </p:bgPr>
+    </p:bg>
+    <p:spTree>
+      <p:nvGrpSpPr>
+        <p:cNvPr id="1" name=""/>
+        <p:cNvGrpSpPr/>
+        <p:nvPr/>
+      </p:nvGrpSpPr>
+      <p:grpSpPr>
+        <a:xfrm>
+          <a:off x="0" y="0"/>
+          <a:ext cx="0" cy="0"/>
+          <a:chOff x="0" y="0"/>
+          <a:chExt cx="0" cy="0"/>
+        </a:xfrm>
+      </p:grpSpPr>
+      <p:pic>
+        <p:nvPicPr>
+          <p:cNvPr id="13" name="Grafik 12" descr="Ein Bild, das Schrift, Screenshot, Grafiken, Text enthält.&#10;&#10;Automatisch generierte Beschreibung">
+            <a:extLst>
+              <a:ext uri="{FF2B5EF4-FFF2-40B4-BE49-F238E27FC236}">
+                <a16:creationId xmlns:a16="http://schemas.microsoft.com/office/drawing/2014/main" id="{CEFD0BAA-CD64-1295-D48F-2145AC9083DE}"/>
+              </a:ext>
+            </a:extLst>
+          </p:cNvPr>
+          <p:cNvPicPr>
+            <a:picLocks noChangeAspect="1"/>
+          </p:cNvPicPr>
+          <p:nvPr/>
+        </p:nvPicPr>
+        <p:blipFill>
+          <a:blip r:embed="rId3">
+            <a:extLst>
+              <a:ext uri="{28A0092B-C50C-407E-A947-70E740481C1C}">
+                <a14:useLocalDpi xmlns:a14="http://schemas.microsoft.com/office/drawing/2010/main" val="0"/>
+              </a:ext>
+            </a:extLst>
+          </a:blip>
+          <a:stretch>
+            <a:fillRect/>
+          </a:stretch>
+        </p:blipFill>
+        <p:spPr>
+          <a:xfrm>
+            <a:off x="53340" y="6121261"/>
+            <a:ext cx="2072640" cy="666699"/>
+          </a:xfrm>
+          <a:prstGeom prst="rect">
+            <a:avLst/>
+          </a:prstGeom>
+        </p:spPr>
+      </p:pic>
+      <p:pic>
+        <p:nvPicPr>
+          <p:cNvPr id="7" name="Grafik 6" descr="Ein Bild, das Text, Diagramm, Plan, technische Zeichnung enthält.&#10;&#10;Automatisch generierte Beschreibung">
+            <a:extLst>
+              <a:ext uri="{FF2B5EF4-FFF2-40B4-BE49-F238E27FC236}">
+                <a16:creationId xmlns:a16="http://schemas.microsoft.com/office/drawing/2014/main" id="{3E554152-1612-7663-820F-ED7775369BFE}"/>
+              </a:ext>
+            </a:extLst>
+          </p:cNvPr>
+          <p:cNvPicPr>
+            <a:picLocks noChangeAspect="1"/>
+          </p:cNvPicPr>
+          <p:nvPr/>
+        </p:nvPicPr>
+        <p:blipFill rotWithShape="1">
+          <a:blip r:embed="rId4">
+            <a:extLst>
+              <a:ext uri="{28A0092B-C50C-407E-A947-70E740481C1C}">
+                <a14:useLocalDpi xmlns:a14="http://schemas.microsoft.com/office/drawing/2010/main" val="0"/>
+              </a:ext>
+            </a:extLst>
+          </a:blip>
+          <a:srcRect l="21204" r="26302" b="56120"/>
+          <a:stretch/>
+        </p:blipFill>
+        <p:spPr>
+          <a:xfrm>
+            <a:off x="552734" y="777923"/>
+            <a:ext cx="10856794" cy="5126172"/>
+          </a:xfrm>
+          <a:prstGeom prst="rect">
+            <a:avLst/>
+          </a:prstGeom>
+        </p:spPr>
+      </p:pic>
+    </p:spTree>
+    <p:extLst>
+      <p:ext uri="{BB962C8B-B14F-4D97-AF65-F5344CB8AC3E}">
+        <p14:creationId xmlns:p14="http://schemas.microsoft.com/office/powerpoint/2010/main" val="1542812945"/>
+      </p:ext>
+    </p:extLst>
+  </p:cSld>
+  <p:clrMapOvr>
+    <a:masterClrMapping/>
+  </p:clrMapOvr>
+  <mc:AlternateContent xmlns:mc="http://schemas.openxmlformats.org/markup-compatibility/2006">
+    <mc:Choice xmlns:p159="http://schemas.microsoft.com/office/powerpoint/2015/09/main" Requires="p159">
+      <p:transition xmlns:p14="http://schemas.microsoft.com/office/powerpoint/2010/main" spd="slow" p14:dur="2000">
+        <p159:morph option="byObject"/>
+      </p:transition>
+    </mc:Choice>
+    <mc:Fallback>
+      <p:transition spd="slow">
+        <p:fade/>
+      </p:transition>
+    </mc:Fallback>
+  </mc:AlternateContent>
+</p:sld>
+</file>
+
+<file path=ppt/slides/slide14.xml><?xml version="1.0" encoding="utf-8"?>
+<p:sld xmlns:a="http://schemas.openxmlformats.org/drawingml/2006/main" xmlns:r="http://schemas.openxmlformats.org/officeDocument/2006/relationships" xmlns:p="http://schemas.openxmlformats.org/presentationml/2006/main">
+  <p:cSld>
+    <p:bg>
+      <p:bgPr>
+        <a:solidFill>
+          <a:srgbClr val="F8F8F8"/>
+        </a:solidFill>
+        <a:effectLst/>
+      </p:bgPr>
+    </p:bg>
+    <p:spTree>
+      <p:nvGrpSpPr>
+        <p:cNvPr id="1" name=""/>
+        <p:cNvGrpSpPr/>
+        <p:nvPr/>
+      </p:nvGrpSpPr>
+      <p:grpSpPr>
+        <a:xfrm>
+          <a:off x="0" y="0"/>
+          <a:ext cx="0" cy="0"/>
+          <a:chOff x="0" y="0"/>
+          <a:chExt cx="0" cy="0"/>
+        </a:xfrm>
+      </p:grpSpPr>
+      <p:pic>
+        <p:nvPicPr>
+          <p:cNvPr id="13" name="Grafik 12" descr="Ein Bild, das Schrift, Screenshot, Grafiken, Text enthält.&#10;&#10;Automatisch generierte Beschreibung">
+            <a:extLst>
+              <a:ext uri="{FF2B5EF4-FFF2-40B4-BE49-F238E27FC236}">
+                <a16:creationId xmlns:a16="http://schemas.microsoft.com/office/drawing/2014/main" id="{CEFD0BAA-CD64-1295-D48F-2145AC9083DE}"/>
+              </a:ext>
+            </a:extLst>
+          </p:cNvPr>
+          <p:cNvPicPr>
+            <a:picLocks noChangeAspect="1"/>
+          </p:cNvPicPr>
+          <p:nvPr/>
+        </p:nvPicPr>
+        <p:blipFill>
+          <a:blip r:embed="rId3">
+            <a:extLst>
+              <a:ext uri="{28A0092B-C50C-407E-A947-70E740481C1C}">
+                <a14:useLocalDpi xmlns:a14="http://schemas.microsoft.com/office/drawing/2010/main" val="0"/>
+              </a:ext>
+            </a:extLst>
+          </a:blip>
+          <a:stretch>
+            <a:fillRect/>
+          </a:stretch>
+        </p:blipFill>
+        <p:spPr>
+          <a:xfrm>
+            <a:off x="53340" y="6121261"/>
+            <a:ext cx="2072640" cy="666699"/>
+          </a:xfrm>
+          <a:prstGeom prst="rect">
+            <a:avLst/>
+          </a:prstGeom>
+        </p:spPr>
+      </p:pic>
+      <p:pic>
+        <p:nvPicPr>
+          <p:cNvPr id="3" name="Grafik 2" descr="Ein Bild, das Text, Diagramm, Plan, technische Zeichnung enthält.&#10;&#10;Automatisch generierte Beschreibung">
+            <a:extLst>
+              <a:ext uri="{FF2B5EF4-FFF2-40B4-BE49-F238E27FC236}">
+                <a16:creationId xmlns:a16="http://schemas.microsoft.com/office/drawing/2014/main" id="{4DC482C4-345A-66F3-8970-88B5B8F1410D}"/>
+              </a:ext>
+            </a:extLst>
+          </p:cNvPr>
+          <p:cNvPicPr>
+            <a:picLocks noChangeAspect="1"/>
+          </p:cNvPicPr>
+          <p:nvPr/>
+        </p:nvPicPr>
+        <p:blipFill rotWithShape="1">
+          <a:blip r:embed="rId4">
+            <a:extLst>
+              <a:ext uri="{28A0092B-C50C-407E-A947-70E740481C1C}">
+                <a14:useLocalDpi xmlns:a14="http://schemas.microsoft.com/office/drawing/2010/main" val="0"/>
+              </a:ext>
+            </a:extLst>
+          </a:blip>
+          <a:srcRect l="22048" t="45870" r="25667" b="32637"/>
+          <a:stretch/>
+        </p:blipFill>
+        <p:spPr>
+          <a:xfrm>
+            <a:off x="242815" y="542591"/>
+            <a:ext cx="11802247" cy="2740358"/>
+          </a:xfrm>
+          <a:prstGeom prst="rect">
+            <a:avLst/>
+          </a:prstGeom>
+        </p:spPr>
+      </p:pic>
+      <p:pic>
+        <p:nvPicPr>
+          <p:cNvPr id="4" name="Grafik 3" descr="Ein Bild, das Text, Diagramm, Plan, technische Zeichnung enthält.&#10;&#10;Automatisch generierte Beschreibung">
+            <a:extLst>
+              <a:ext uri="{FF2B5EF4-FFF2-40B4-BE49-F238E27FC236}">
+                <a16:creationId xmlns:a16="http://schemas.microsoft.com/office/drawing/2014/main" id="{202D83ED-9F3C-C573-6A56-3BC8433F6973}"/>
+              </a:ext>
+            </a:extLst>
+          </p:cNvPr>
+          <p:cNvPicPr>
+            <a:picLocks noChangeAspect="1"/>
+          </p:cNvPicPr>
+          <p:nvPr/>
+        </p:nvPicPr>
+        <p:blipFill rotWithShape="1">
+          <a:blip r:embed="rId5">
+            <a:extLst>
+              <a:ext uri="{28A0092B-C50C-407E-A947-70E740481C1C}">
+                <a14:useLocalDpi xmlns:a14="http://schemas.microsoft.com/office/drawing/2010/main" val="0"/>
+              </a:ext>
+            </a:extLst>
+          </a:blip>
+          <a:srcRect l="74333" t="45734" b="32773"/>
+          <a:stretch/>
+        </p:blipFill>
+        <p:spPr>
+          <a:xfrm>
+            <a:off x="2729784" y="3575051"/>
+            <a:ext cx="6411413" cy="3032458"/>
+          </a:xfrm>
+          <a:prstGeom prst="rect">
+            <a:avLst/>
+          </a:prstGeom>
+        </p:spPr>
+      </p:pic>
+    </p:spTree>
+    <p:extLst>
+      <p:ext uri="{BB962C8B-B14F-4D97-AF65-F5344CB8AC3E}">
+        <p14:creationId xmlns:p14="http://schemas.microsoft.com/office/powerpoint/2010/main" val="2650353062"/>
+      </p:ext>
+    </p:extLst>
+  </p:cSld>
+  <p:clrMapOvr>
+    <a:masterClrMapping/>
+  </p:clrMapOvr>
+  <mc:AlternateContent xmlns:mc="http://schemas.openxmlformats.org/markup-compatibility/2006">
+    <mc:Choice xmlns:p159="http://schemas.microsoft.com/office/powerpoint/2015/09/main" Requires="p159">
+      <p:transition xmlns:p14="http://schemas.microsoft.com/office/powerpoint/2010/main" spd="slow" p14:dur="2000">
+        <p159:morph option="byObject"/>
+      </p:transition>
+    </mc:Choice>
+    <mc:Fallback>
+      <p:transition spd="slow">
+        <p:fade/>
+      </p:transition>
+    </mc:Fallback>
+  </mc:AlternateContent>
+</p:sld>
+</file>
+
+<file path=ppt/slides/slide15.xml><?xml version="1.0" encoding="utf-8"?>
+<p:sld xmlns:a="http://schemas.openxmlformats.org/drawingml/2006/main" xmlns:r="http://schemas.openxmlformats.org/officeDocument/2006/relationships" xmlns:p="http://schemas.openxmlformats.org/presentationml/2006/main">
+  <p:cSld>
+    <p:bg>
+      <p:bgPr>
+        <a:solidFill>
+          <a:srgbClr val="F8F8F8"/>
+        </a:solidFill>
+        <a:effectLst/>
+      </p:bgPr>
+    </p:bg>
+    <p:spTree>
+      <p:nvGrpSpPr>
+        <p:cNvPr id="1" name=""/>
+        <p:cNvGrpSpPr/>
+        <p:nvPr/>
+      </p:nvGrpSpPr>
+      <p:grpSpPr>
+        <a:xfrm>
+          <a:off x="0" y="0"/>
+          <a:ext cx="0" cy="0"/>
+          <a:chOff x="0" y="0"/>
+          <a:chExt cx="0" cy="0"/>
+        </a:xfrm>
+      </p:grpSpPr>
+      <p:pic>
+        <p:nvPicPr>
+          <p:cNvPr id="13" name="Grafik 12" descr="Ein Bild, das Schrift, Screenshot, Grafiken, Text enthält.&#10;&#10;Automatisch generierte Beschreibung">
+            <a:extLst>
+              <a:ext uri="{FF2B5EF4-FFF2-40B4-BE49-F238E27FC236}">
+                <a16:creationId xmlns:a16="http://schemas.microsoft.com/office/drawing/2014/main" id="{CEFD0BAA-CD64-1295-D48F-2145AC9083DE}"/>
+              </a:ext>
+            </a:extLst>
+          </p:cNvPr>
+          <p:cNvPicPr>
+            <a:picLocks noChangeAspect="1"/>
+          </p:cNvPicPr>
+          <p:nvPr/>
+        </p:nvPicPr>
+        <p:blipFill>
+          <a:blip r:embed="rId3">
+            <a:extLst>
+              <a:ext uri="{28A0092B-C50C-407E-A947-70E740481C1C}">
+                <a14:useLocalDpi xmlns:a14="http://schemas.microsoft.com/office/drawing/2010/main" val="0"/>
+              </a:ext>
+            </a:extLst>
+          </a:blip>
+          <a:stretch>
+            <a:fillRect/>
+          </a:stretch>
+        </p:blipFill>
+        <p:spPr>
+          <a:xfrm>
+            <a:off x="53340" y="6121261"/>
+            <a:ext cx="2072640" cy="666699"/>
+          </a:xfrm>
+          <a:prstGeom prst="rect">
+            <a:avLst/>
+          </a:prstGeom>
+        </p:spPr>
+      </p:pic>
+      <p:pic>
+        <p:nvPicPr>
+          <p:cNvPr id="3" name="Grafik 2" descr="Ein Bild, das Text, Diagramm, Plan, technische Zeichnung enthält.&#10;&#10;Automatisch generierte Beschreibung">
+            <a:extLst>
+              <a:ext uri="{FF2B5EF4-FFF2-40B4-BE49-F238E27FC236}">
+                <a16:creationId xmlns:a16="http://schemas.microsoft.com/office/drawing/2014/main" id="{4DC482C4-345A-66F3-8970-88B5B8F1410D}"/>
+              </a:ext>
+            </a:extLst>
+          </p:cNvPr>
+          <p:cNvPicPr>
+            <a:picLocks noChangeAspect="1"/>
+          </p:cNvPicPr>
+          <p:nvPr/>
+        </p:nvPicPr>
+        <p:blipFill rotWithShape="1">
+          <a:blip r:embed="rId4">
+            <a:extLst>
+              <a:ext uri="{28A0092B-C50C-407E-A947-70E740481C1C}">
+                <a14:useLocalDpi xmlns:a14="http://schemas.microsoft.com/office/drawing/2010/main" val="0"/>
+              </a:ext>
+            </a:extLst>
+          </a:blip>
+          <a:srcRect l="21993" t="67173" r="56015" b="16656"/>
+          <a:stretch/>
+        </p:blipFill>
+        <p:spPr>
+          <a:xfrm>
+            <a:off x="287906" y="457200"/>
+            <a:ext cx="5611006" cy="2330450"/>
+          </a:xfrm>
+          <a:prstGeom prst="rect">
+            <a:avLst/>
+          </a:prstGeom>
+        </p:spPr>
+      </p:pic>
+      <p:pic>
+        <p:nvPicPr>
+          <p:cNvPr id="4" name="Grafik 3" descr="Ein Bild, das Text, Diagramm, Plan, technische Zeichnung enthält.&#10;&#10;Automatisch generierte Beschreibung">
+            <a:extLst>
+              <a:ext uri="{FF2B5EF4-FFF2-40B4-BE49-F238E27FC236}">
+                <a16:creationId xmlns:a16="http://schemas.microsoft.com/office/drawing/2014/main" id="{C96BEED5-CBA5-E532-7D05-5CE0B602F03F}"/>
+              </a:ext>
+            </a:extLst>
+          </p:cNvPr>
+          <p:cNvPicPr>
+            <a:picLocks noChangeAspect="1"/>
+          </p:cNvPicPr>
+          <p:nvPr/>
+        </p:nvPicPr>
+        <p:blipFill rotWithShape="1">
+          <a:blip r:embed="rId4">
+            <a:extLst>
+              <a:ext uri="{28A0092B-C50C-407E-A947-70E740481C1C}">
+                <a14:useLocalDpi xmlns:a14="http://schemas.microsoft.com/office/drawing/2010/main" val="0"/>
+              </a:ext>
+            </a:extLst>
+          </a:blip>
+          <a:srcRect t="82464" r="56015"/>
+          <a:stretch/>
+        </p:blipFill>
+        <p:spPr>
+          <a:xfrm>
+            <a:off x="484993" y="3239163"/>
+            <a:ext cx="11222013" cy="2527161"/>
+          </a:xfrm>
+          <a:prstGeom prst="rect">
+            <a:avLst/>
+          </a:prstGeom>
+        </p:spPr>
+      </p:pic>
+      <p:pic>
+        <p:nvPicPr>
+          <p:cNvPr id="5" name="Grafik 4" descr="Ein Bild, das Text, Diagramm, Plan, technische Zeichnung enthält.&#10;&#10;Automatisch generierte Beschreibung">
+            <a:extLst>
+              <a:ext uri="{FF2B5EF4-FFF2-40B4-BE49-F238E27FC236}">
+                <a16:creationId xmlns:a16="http://schemas.microsoft.com/office/drawing/2014/main" id="{A9D41888-D17A-8166-B921-B8081D43B53A}"/>
+              </a:ext>
+            </a:extLst>
+          </p:cNvPr>
+          <p:cNvPicPr>
+            <a:picLocks noChangeAspect="1"/>
+          </p:cNvPicPr>
+          <p:nvPr/>
+        </p:nvPicPr>
+        <p:blipFill rotWithShape="1">
+          <a:blip r:embed="rId4">
+            <a:extLst>
+              <a:ext uri="{28A0092B-C50C-407E-A947-70E740481C1C}">
+                <a14:useLocalDpi xmlns:a14="http://schemas.microsoft.com/office/drawing/2010/main" val="0"/>
+              </a:ext>
+            </a:extLst>
+          </a:blip>
+          <a:srcRect l="47333" t="67037" r="25314" b="12778"/>
+          <a:stretch/>
+        </p:blipFill>
+        <p:spPr>
+          <a:xfrm>
+            <a:off x="6313152" y="457200"/>
+            <a:ext cx="5590942" cy="2330450"/>
+          </a:xfrm>
+          <a:prstGeom prst="rect">
+            <a:avLst/>
+          </a:prstGeom>
+        </p:spPr>
+      </p:pic>
+    </p:spTree>
+    <p:extLst>
+      <p:ext uri="{BB962C8B-B14F-4D97-AF65-F5344CB8AC3E}">
+        <p14:creationId xmlns:p14="http://schemas.microsoft.com/office/powerpoint/2010/main" val="1716127097"/>
+      </p:ext>
+    </p:extLst>
+  </p:cSld>
+  <p:clrMapOvr>
+    <a:masterClrMapping/>
+  </p:clrMapOvr>
+  <mc:AlternateContent xmlns:mc="http://schemas.openxmlformats.org/markup-compatibility/2006">
+    <mc:Choice xmlns:p159="http://schemas.microsoft.com/office/powerpoint/2015/09/main" Requires="p159">
+      <p:transition xmlns:p14="http://schemas.microsoft.com/office/powerpoint/2010/main" spd="slow" p14:dur="2000">
+        <p159:morph option="byObject"/>
+      </p:transition>
+    </mc:Choice>
+    <mc:Fallback>
+      <p:transition spd="slow">
+        <p:fade/>
+      </p:transition>
+    </mc:Fallback>
+  </mc:AlternateContent>
+</p:sld>
+</file>
+
+<file path=ppt/slides/slide16.xml><?xml version="1.0" encoding="utf-8"?>
 <p:sld xmlns:a="http://schemas.openxmlformats.org/drawingml/2006/main" xmlns:r="http://schemas.openxmlformats.org/officeDocument/2006/relationships" xmlns:p="http://schemas.openxmlformats.org/presentationml/2006/main" show="0">
   <p:cSld>
     <p:bg>

</xml_diff>